<commit_message>
AD HW1 fix graph image + CNS slide
</commit_message>
<xml_diff>
--- a/Mandatory Exams/Algorithm Design/HW1/graph.pptx
+++ b/Mandatory Exams/Algorithm Design/HW1/graph.pptx
@@ -6,6 +6,7 @@
   </p:sldMasterIdLst>
   <p:sldIdLst>
     <p:sldId id="256" r:id="rId2"/>
+    <p:sldId id="259" r:id="rId3"/>
   </p:sldIdLst>
   <p:sldSz cx="12192000" cy="6858000"/>
   <p:notesSz cx="6858000" cy="9144000"/>
@@ -104,7 +105,24 @@
       </a:defRPr>
     </a:lvl9pPr>
   </p:defaultTextStyle>
+  <p:extLst>
+    <p:ext uri="{EFAFB233-063F-42B5-8137-9DF3F51BA10A}">
+      <p15:sldGuideLst xmlns:p15="http://schemas.microsoft.com/office/powerpoint/2012/main"/>
+    </p:ext>
+  </p:extLst>
 </p:presentation>
+</file>
+
+<file path=ppt/commentAuthors.xml><?xml version="1.0" encoding="utf-8"?>
+<p:cmAuthorLst xmlns:a="http://schemas.openxmlformats.org/drawingml/2006/main" xmlns:r="http://schemas.openxmlformats.org/officeDocument/2006/relationships" xmlns:p="http://schemas.openxmlformats.org/presentationml/2006/main">
+  <p:cmAuthor id="1" name="Edoardo Puglisi" initials="EP" lastIdx="1" clrIdx="0">
+    <p:extLst>
+      <p:ext uri="{19B8F6BF-5375-455C-9EA6-DF929625EA0E}">
+        <p15:presenceInfo xmlns:p15="http://schemas.microsoft.com/office/powerpoint/2012/main" userId="5c60b047d55174b8" providerId="Windows Live"/>
+      </p:ext>
+    </p:extLst>
+  </p:cmAuthor>
+</p:cmAuthorLst>
 </file>
 
 <file path=ppt/slideLayouts/slideLayout1.xml><?xml version="1.0" encoding="utf-8"?>
@@ -254,7 +272,7 @@
           <a:p>
             <a:fld id="{6528BFEA-4FF3-4671-B5C8-C723815C4CB3}" type="datetimeFigureOut">
               <a:rPr lang="it-IT" smtClean="0"/>
-              <a:t>23/11/2019</a:t>
+              <a:t>30/11/2019</a:t>
             </a:fld>
             <a:endParaRPr lang="it-IT"/>
           </a:p>
@@ -452,7 +470,7 @@
           <a:p>
             <a:fld id="{6528BFEA-4FF3-4671-B5C8-C723815C4CB3}" type="datetimeFigureOut">
               <a:rPr lang="it-IT" smtClean="0"/>
-              <a:t>23/11/2019</a:t>
+              <a:t>30/11/2019</a:t>
             </a:fld>
             <a:endParaRPr lang="it-IT"/>
           </a:p>
@@ -660,7 +678,7 @@
           <a:p>
             <a:fld id="{6528BFEA-4FF3-4671-B5C8-C723815C4CB3}" type="datetimeFigureOut">
               <a:rPr lang="it-IT" smtClean="0"/>
-              <a:t>23/11/2019</a:t>
+              <a:t>30/11/2019</a:t>
             </a:fld>
             <a:endParaRPr lang="it-IT"/>
           </a:p>
@@ -858,7 +876,7 @@
           <a:p>
             <a:fld id="{6528BFEA-4FF3-4671-B5C8-C723815C4CB3}" type="datetimeFigureOut">
               <a:rPr lang="it-IT" smtClean="0"/>
-              <a:t>23/11/2019</a:t>
+              <a:t>30/11/2019</a:t>
             </a:fld>
             <a:endParaRPr lang="it-IT"/>
           </a:p>
@@ -1133,7 +1151,7 @@
           <a:p>
             <a:fld id="{6528BFEA-4FF3-4671-B5C8-C723815C4CB3}" type="datetimeFigureOut">
               <a:rPr lang="it-IT" smtClean="0"/>
-              <a:t>23/11/2019</a:t>
+              <a:t>30/11/2019</a:t>
             </a:fld>
             <a:endParaRPr lang="it-IT"/>
           </a:p>
@@ -1398,7 +1416,7 @@
           <a:p>
             <a:fld id="{6528BFEA-4FF3-4671-B5C8-C723815C4CB3}" type="datetimeFigureOut">
               <a:rPr lang="it-IT" smtClean="0"/>
-              <a:t>23/11/2019</a:t>
+              <a:t>30/11/2019</a:t>
             </a:fld>
             <a:endParaRPr lang="it-IT"/>
           </a:p>
@@ -1810,7 +1828,7 @@
           <a:p>
             <a:fld id="{6528BFEA-4FF3-4671-B5C8-C723815C4CB3}" type="datetimeFigureOut">
               <a:rPr lang="it-IT" smtClean="0"/>
-              <a:t>23/11/2019</a:t>
+              <a:t>30/11/2019</a:t>
             </a:fld>
             <a:endParaRPr lang="it-IT"/>
           </a:p>
@@ -1951,7 +1969,7 @@
           <a:p>
             <a:fld id="{6528BFEA-4FF3-4671-B5C8-C723815C4CB3}" type="datetimeFigureOut">
               <a:rPr lang="it-IT" smtClean="0"/>
-              <a:t>23/11/2019</a:t>
+              <a:t>30/11/2019</a:t>
             </a:fld>
             <a:endParaRPr lang="it-IT"/>
           </a:p>
@@ -2064,7 +2082,7 @@
           <a:p>
             <a:fld id="{6528BFEA-4FF3-4671-B5C8-C723815C4CB3}" type="datetimeFigureOut">
               <a:rPr lang="it-IT" smtClean="0"/>
-              <a:t>23/11/2019</a:t>
+              <a:t>30/11/2019</a:t>
             </a:fld>
             <a:endParaRPr lang="it-IT"/>
           </a:p>
@@ -2375,7 +2393,7 @@
           <a:p>
             <a:fld id="{6528BFEA-4FF3-4671-B5C8-C723815C4CB3}" type="datetimeFigureOut">
               <a:rPr lang="it-IT" smtClean="0"/>
-              <a:t>23/11/2019</a:t>
+              <a:t>30/11/2019</a:t>
             </a:fld>
             <a:endParaRPr lang="it-IT"/>
           </a:p>
@@ -2663,7 +2681,7 @@
           <a:p>
             <a:fld id="{6528BFEA-4FF3-4671-B5C8-C723815C4CB3}" type="datetimeFigureOut">
               <a:rPr lang="it-IT" smtClean="0"/>
-              <a:t>23/11/2019</a:t>
+              <a:t>30/11/2019</a:t>
             </a:fld>
             <a:endParaRPr lang="it-IT"/>
           </a:p>
@@ -2904,7 +2922,7 @@
           <a:p>
             <a:fld id="{6528BFEA-4FF3-4671-B5C8-C723815C4CB3}" type="datetimeFigureOut">
               <a:rPr lang="it-IT" smtClean="0"/>
-              <a:t>23/11/2019</a:t>
+              <a:t>30/11/2019</a:t>
             </a:fld>
             <a:endParaRPr lang="it-IT"/>
           </a:p>
@@ -3672,20 +3690,18 @@
           </p:cNvPr>
           <p:cNvCxnSpPr>
             <a:cxnSpLocks/>
-            <a:stCxn id="6" idx="5"/>
-            <a:endCxn id="9" idx="0"/>
+            <a:stCxn id="6" idx="3"/>
+            <a:endCxn id="9" idx="2"/>
           </p:cNvCxnSpPr>
           <p:nvPr/>
         </p:nvCxnSpPr>
         <p:spPr>
           <a:xfrm rot="16200000" flipH="1">
-            <a:off x="1878552" y="3624576"/>
-            <a:ext cx="1633287" cy="2688208"/>
-          </a:xfrm>
-          <a:prstGeom prst="curvedConnector3">
-            <a:avLst>
-              <a:gd name="adj1" fmla="val 50000"/>
-            </a:avLst>
+            <a:off x="1098063" y="3758487"/>
+            <a:ext cx="2090487" cy="2877586"/>
+          </a:xfrm>
+          <a:prstGeom prst="curvedConnector2">
+            <a:avLst/>
           </a:prstGeom>
           <a:ln>
             <a:tailEnd type="triangle"/>
@@ -3846,15 +3862,15 @@
           </p:cNvPr>
           <p:cNvCxnSpPr>
             <a:cxnSpLocks/>
-            <a:stCxn id="9" idx="7"/>
+            <a:stCxn id="9" idx="6"/>
             <a:endCxn id="5" idx="3"/>
           </p:cNvCxnSpPr>
           <p:nvPr/>
         </p:nvCxnSpPr>
         <p:spPr>
           <a:xfrm flipV="1">
-            <a:off x="4362588" y="4615372"/>
-            <a:ext cx="1657598" cy="1303863"/>
+            <a:off x="4496499" y="4615372"/>
+            <a:ext cx="1523687" cy="1627152"/>
           </a:xfrm>
           <a:prstGeom prst="straightConnector1">
             <a:avLst/>
@@ -3889,60 +3905,17 @@
           </p:cNvPr>
           <p:cNvCxnSpPr>
             <a:cxnSpLocks/>
-            <a:stCxn id="8" idx="6"/>
+            <a:stCxn id="8" idx="7"/>
             <a:endCxn id="5" idx="1"/>
           </p:cNvCxnSpPr>
           <p:nvPr/>
         </p:nvCxnSpPr>
         <p:spPr>
           <a:xfrm>
-            <a:off x="3822855" y="1960927"/>
-            <a:ext cx="2197331" cy="2007867"/>
+            <a:off x="3688944" y="1637638"/>
+            <a:ext cx="2331242" cy="2331156"/>
           </a:xfrm>
           <a:prstGeom prst="straightConnector1">
-            <a:avLst/>
-          </a:prstGeom>
-          <a:ln>
-            <a:tailEnd type="triangle"/>
-          </a:ln>
-        </p:spPr>
-        <p:style>
-          <a:lnRef idx="1">
-            <a:schemeClr val="dk1"/>
-          </a:lnRef>
-          <a:fillRef idx="0">
-            <a:schemeClr val="dk1"/>
-          </a:fillRef>
-          <a:effectRef idx="0">
-            <a:schemeClr val="dk1"/>
-          </a:effectRef>
-          <a:fontRef idx="minor">
-            <a:schemeClr val="tx1"/>
-          </a:fontRef>
-        </p:style>
-      </p:cxnSp>
-      <p:cxnSp>
-        <p:nvCxnSpPr>
-          <p:cNvPr id="39" name="Connettore curvo 38">
-            <a:extLst>
-              <a:ext uri="{FF2B5EF4-FFF2-40B4-BE49-F238E27FC236}">
-                <a16:creationId xmlns:a16="http://schemas.microsoft.com/office/drawing/2014/main" id="{26A01BD3-D65C-4B7C-BB9C-D4CC3A60A538}"/>
-              </a:ext>
-            </a:extLst>
-          </p:cNvPr>
-          <p:cNvCxnSpPr>
-            <a:cxnSpLocks/>
-            <a:stCxn id="9" idx="2"/>
-            <a:endCxn id="6" idx="3"/>
-          </p:cNvCxnSpPr>
-          <p:nvPr/>
-        </p:nvCxnSpPr>
-        <p:spPr>
-          <a:xfrm rot="10800000">
-            <a:off x="704513" y="4152038"/>
-            <a:ext cx="2877586" cy="2090487"/>
-          </a:xfrm>
-          <a:prstGeom prst="curvedConnector2">
             <a:avLst/>
           </a:prstGeom>
           <a:ln>
@@ -4030,51 +4003,6 @@
           </a:xfrm>
           <a:prstGeom prst="straightConnector1">
             <a:avLst/>
-          </a:prstGeom>
-          <a:ln>
-            <a:tailEnd type="triangle"/>
-          </a:ln>
-        </p:spPr>
-        <p:style>
-          <a:lnRef idx="1">
-            <a:schemeClr val="dk1"/>
-          </a:lnRef>
-          <a:fillRef idx="0">
-            <a:schemeClr val="dk1"/>
-          </a:fillRef>
-          <a:effectRef idx="0">
-            <a:schemeClr val="dk1"/>
-          </a:effectRef>
-          <a:fontRef idx="minor">
-            <a:schemeClr val="tx1"/>
-          </a:fontRef>
-        </p:style>
-      </p:cxnSp>
-      <p:cxnSp>
-        <p:nvCxnSpPr>
-          <p:cNvPr id="54" name="Connettore curvo 53">
-            <a:extLst>
-              <a:ext uri="{FF2B5EF4-FFF2-40B4-BE49-F238E27FC236}">
-                <a16:creationId xmlns:a16="http://schemas.microsoft.com/office/drawing/2014/main" id="{7D399C2C-7921-4E40-A97B-6E1575080EB2}"/>
-              </a:ext>
-            </a:extLst>
-          </p:cNvPr>
-          <p:cNvCxnSpPr>
-            <a:cxnSpLocks/>
-            <a:stCxn id="8" idx="5"/>
-            <a:endCxn id="6" idx="7"/>
-          </p:cNvCxnSpPr>
-          <p:nvPr/>
-        </p:nvCxnSpPr>
-        <p:spPr>
-          <a:xfrm rot="5400000">
-            <a:off x="1909397" y="1725911"/>
-            <a:ext cx="1221243" cy="2337853"/>
-          </a:xfrm>
-          <a:prstGeom prst="curvedConnector3">
-            <a:avLst>
-              <a:gd name="adj1" fmla="val 50000"/>
-            </a:avLst>
           </a:prstGeom>
           <a:ln>
             <a:tailEnd type="triangle"/>
@@ -4668,7 +4596,7 @@
         </p:nvSpPr>
         <p:spPr>
           <a:xfrm>
-            <a:off x="3289241" y="3711313"/>
+            <a:off x="2021050" y="3523717"/>
             <a:ext cx="585715" cy="400110"/>
           </a:xfrm>
           <a:prstGeom prst="rect">
@@ -4812,7 +4740,7 @@
         </p:nvSpPr>
         <p:spPr>
           <a:xfrm>
-            <a:off x="4978749" y="5291044"/>
+            <a:off x="5258342" y="5302594"/>
             <a:ext cx="585715" cy="400110"/>
           </a:xfrm>
           <a:prstGeom prst="rect">
@@ -4896,10 +4824,10 @@
       </p:sp>
       <p:sp>
         <p:nvSpPr>
-          <p:cNvPr id="127" name="Rettangolo 126">
-            <a:extLst>
-              <a:ext uri="{FF2B5EF4-FFF2-40B4-BE49-F238E27FC236}">
-                <a16:creationId xmlns:a16="http://schemas.microsoft.com/office/drawing/2014/main" id="{6258B94A-94B2-4699-B00B-C709F2B5F130}"/>
+          <p:cNvPr id="25" name="Rettangolo 24">
+            <a:extLst>
+              <a:ext uri="{FF2B5EF4-FFF2-40B4-BE49-F238E27FC236}">
+                <a16:creationId xmlns:a16="http://schemas.microsoft.com/office/drawing/2014/main" id="{28035FC4-33DF-42B7-803C-F3D244779C11}"/>
               </a:ext>
             </a:extLst>
           </p:cNvPr>
@@ -4908,7 +4836,7 @@
         </p:nvSpPr>
         <p:spPr>
           <a:xfrm>
-            <a:off x="2143305" y="2994673"/>
+            <a:off x="1277924" y="5719180"/>
             <a:ext cx="585715" cy="400110"/>
           </a:xfrm>
           <a:prstGeom prst="rect">
@@ -4937,17 +4865,103 @@
                   </a:outerShdw>
                 </a:effectLst>
               </a:rPr>
-              <a:t>0/1</a:t>
-            </a:r>
-          </a:p>
-        </p:txBody>
-      </p:sp>
-      <p:sp>
-        <p:nvSpPr>
-          <p:cNvPr id="128" name="Rettangolo 127">
-            <a:extLst>
-              <a:ext uri="{FF2B5EF4-FFF2-40B4-BE49-F238E27FC236}">
-                <a16:creationId xmlns:a16="http://schemas.microsoft.com/office/drawing/2014/main" id="{303FA017-4492-41D5-9E48-9B95E62BAD06}"/>
+              <a:t>0/2</a:t>
+            </a:r>
+          </a:p>
+        </p:txBody>
+      </p:sp>
+      <p:cxnSp>
+        <p:nvCxnSpPr>
+          <p:cNvPr id="41" name="Connettore 2 40">
+            <a:extLst>
+              <a:ext uri="{FF2B5EF4-FFF2-40B4-BE49-F238E27FC236}">
+                <a16:creationId xmlns:a16="http://schemas.microsoft.com/office/drawing/2014/main" id="{DE87AE4B-67A7-4FDB-9FCB-0D05574026B8}"/>
+              </a:ext>
+            </a:extLst>
+          </p:cNvPr>
+          <p:cNvCxnSpPr>
+            <a:cxnSpLocks/>
+            <a:stCxn id="8" idx="3"/>
+            <a:endCxn id="9" idx="1"/>
+          </p:cNvCxnSpPr>
+          <p:nvPr/>
+        </p:nvCxnSpPr>
+        <p:spPr>
+          <a:xfrm>
+            <a:off x="3042366" y="2284216"/>
+            <a:ext cx="673644" cy="3635019"/>
+          </a:xfrm>
+          <a:prstGeom prst="straightConnector1">
+            <a:avLst/>
+          </a:prstGeom>
+          <a:ln>
+            <a:tailEnd type="triangle"/>
+          </a:ln>
+        </p:spPr>
+        <p:style>
+          <a:lnRef idx="1">
+            <a:schemeClr val="dk1"/>
+          </a:lnRef>
+          <a:fillRef idx="0">
+            <a:schemeClr val="dk1"/>
+          </a:fillRef>
+          <a:effectRef idx="0">
+            <a:schemeClr val="dk1"/>
+          </a:effectRef>
+          <a:fontRef idx="minor">
+            <a:schemeClr val="tx1"/>
+          </a:fontRef>
+        </p:style>
+      </p:cxnSp>
+      <p:cxnSp>
+        <p:nvCxnSpPr>
+          <p:cNvPr id="44" name="Connettore 2 43">
+            <a:extLst>
+              <a:ext uri="{FF2B5EF4-FFF2-40B4-BE49-F238E27FC236}">
+                <a16:creationId xmlns:a16="http://schemas.microsoft.com/office/drawing/2014/main" id="{5654BD40-6EC1-4248-B05D-94F3B0E49030}"/>
+              </a:ext>
+            </a:extLst>
+          </p:cNvPr>
+          <p:cNvCxnSpPr>
+            <a:cxnSpLocks/>
+            <a:stCxn id="9" idx="0"/>
+            <a:endCxn id="8" idx="5"/>
+          </p:cNvCxnSpPr>
+          <p:nvPr/>
+        </p:nvCxnSpPr>
+        <p:spPr>
+          <a:xfrm flipH="1" flipV="1">
+            <a:off x="3688944" y="2284216"/>
+            <a:ext cx="350355" cy="3501108"/>
+          </a:xfrm>
+          <a:prstGeom prst="straightConnector1">
+            <a:avLst/>
+          </a:prstGeom>
+          <a:ln>
+            <a:tailEnd type="triangle"/>
+          </a:ln>
+        </p:spPr>
+        <p:style>
+          <a:lnRef idx="1">
+            <a:schemeClr val="dk1"/>
+          </a:lnRef>
+          <a:fillRef idx="0">
+            <a:schemeClr val="dk1"/>
+          </a:fillRef>
+          <a:effectRef idx="0">
+            <a:schemeClr val="dk1"/>
+          </a:effectRef>
+          <a:fontRef idx="minor">
+            <a:schemeClr val="tx1"/>
+          </a:fontRef>
+        </p:style>
+      </p:cxnSp>
+      <p:sp>
+        <p:nvSpPr>
+          <p:cNvPr id="47" name="Rettangolo 46">
+            <a:extLst>
+              <a:ext uri="{FF2B5EF4-FFF2-40B4-BE49-F238E27FC236}">
+                <a16:creationId xmlns:a16="http://schemas.microsoft.com/office/drawing/2014/main" id="{6FA56567-0602-4C50-BF15-BEA6D2486BDD}"/>
               </a:ext>
             </a:extLst>
           </p:cNvPr>
@@ -4956,7 +4970,7 @@
         </p:nvSpPr>
         <p:spPr>
           <a:xfrm>
-            <a:off x="2771213" y="4553113"/>
+            <a:off x="2935521" y="4787665"/>
             <a:ext cx="585715" cy="400110"/>
           </a:xfrm>
           <a:prstGeom prst="rect">
@@ -4985,17 +4999,17 @@
                   </a:outerShdw>
                 </a:effectLst>
               </a:rPr>
-              <a:t>0/2</a:t>
-            </a:r>
-          </a:p>
-        </p:txBody>
-      </p:sp>
-      <p:sp>
-        <p:nvSpPr>
-          <p:cNvPr id="129" name="Rettangolo 128">
-            <a:extLst>
-              <a:ext uri="{FF2B5EF4-FFF2-40B4-BE49-F238E27FC236}">
-                <a16:creationId xmlns:a16="http://schemas.microsoft.com/office/drawing/2014/main" id="{D985BB8C-C928-4DA3-A861-107637FC8AA1}"/>
+              <a:t>0/1</a:t>
+            </a:r>
+          </a:p>
+        </p:txBody>
+      </p:sp>
+      <p:sp>
+        <p:nvSpPr>
+          <p:cNvPr id="48" name="Rettangolo 47">
+            <a:extLst>
+              <a:ext uri="{FF2B5EF4-FFF2-40B4-BE49-F238E27FC236}">
+                <a16:creationId xmlns:a16="http://schemas.microsoft.com/office/drawing/2014/main" id="{3410096E-EDE6-4F55-AFEA-4AEA7DD032E9}"/>
               </a:ext>
             </a:extLst>
           </p:cNvPr>
@@ -5004,7 +5018,7 @@
         </p:nvSpPr>
         <p:spPr>
           <a:xfrm>
-            <a:off x="1217182" y="5753659"/>
+            <a:off x="3746441" y="3082918"/>
             <a:ext cx="585715" cy="400110"/>
           </a:xfrm>
           <a:prstGeom prst="rect">
@@ -5033,7 +5047,7 @@
                   </a:outerShdw>
                 </a:effectLst>
               </a:rPr>
-              <a:t>0/3</a:t>
+              <a:t>0/2</a:t>
             </a:r>
           </a:p>
         </p:txBody>
@@ -5042,6 +5056,3207 @@
     <p:extLst>
       <p:ext uri="{BB962C8B-B14F-4D97-AF65-F5344CB8AC3E}">
         <p14:creationId xmlns:p14="http://schemas.microsoft.com/office/powerpoint/2010/main" val="1745966762"/>
+      </p:ext>
+    </p:extLst>
+  </p:cSld>
+  <p:clrMapOvr>
+    <a:masterClrMapping/>
+  </p:clrMapOvr>
+</p:sld>
+</file>
+
+<file path=ppt/slides/slide2.xml><?xml version="1.0" encoding="utf-8"?>
+<p:sld xmlns:a="http://schemas.openxmlformats.org/drawingml/2006/main" xmlns:r="http://schemas.openxmlformats.org/officeDocument/2006/relationships" xmlns:p="http://schemas.openxmlformats.org/presentationml/2006/main">
+  <p:cSld>
+    <p:spTree>
+      <p:nvGrpSpPr>
+        <p:cNvPr id="1" name=""/>
+        <p:cNvGrpSpPr/>
+        <p:nvPr/>
+      </p:nvGrpSpPr>
+      <p:grpSpPr>
+        <a:xfrm>
+          <a:off x="0" y="0"/>
+          <a:ext cx="0" cy="0"/>
+          <a:chOff x="0" y="0"/>
+          <a:chExt cx="0" cy="0"/>
+        </a:xfrm>
+      </p:grpSpPr>
+      <p:sp>
+        <p:nvSpPr>
+          <p:cNvPr id="4" name="Ovale 3">
+            <a:extLst>
+              <a:ext uri="{FF2B5EF4-FFF2-40B4-BE49-F238E27FC236}">
+                <a16:creationId xmlns:a16="http://schemas.microsoft.com/office/drawing/2014/main" id="{84D6EF6B-4F4A-4397-941C-06219394290F}"/>
+              </a:ext>
+            </a:extLst>
+          </p:cNvPr>
+          <p:cNvSpPr/>
+          <p:nvPr/>
+        </p:nvSpPr>
+        <p:spPr>
+          <a:xfrm>
+            <a:off x="26250" y="4388194"/>
+            <a:ext cx="914400" cy="914400"/>
+          </a:xfrm>
+          <a:prstGeom prst="ellipse">
+            <a:avLst/>
+          </a:prstGeom>
+        </p:spPr>
+        <p:style>
+          <a:lnRef idx="2">
+            <a:schemeClr val="dk1">
+              <a:shade val="50000"/>
+            </a:schemeClr>
+          </a:lnRef>
+          <a:fillRef idx="1">
+            <a:schemeClr val="dk1"/>
+          </a:fillRef>
+          <a:effectRef idx="0">
+            <a:schemeClr val="dk1"/>
+          </a:effectRef>
+          <a:fontRef idx="minor">
+            <a:schemeClr val="lt1"/>
+          </a:fontRef>
+        </p:style>
+        <p:txBody>
+          <a:bodyPr rtlCol="0" anchor="ctr"/>
+          <a:lstStyle/>
+          <a:p>
+            <a:pPr algn="ctr"/>
+            <a:r>
+              <a:rPr lang="it-IT" sz="4400" b="1" dirty="0">
+                <a:latin typeface="Arial" panose="020B0604020202020204" pitchFamily="34" charset="0"/>
+                <a:cs typeface="Arial" panose="020B0604020202020204" pitchFamily="34" charset="0"/>
+              </a:rPr>
+              <a:t>S</a:t>
+            </a:r>
+          </a:p>
+        </p:txBody>
+      </p:sp>
+      <p:sp>
+        <p:nvSpPr>
+          <p:cNvPr id="5" name="Ovale 4">
+            <a:extLst>
+              <a:ext uri="{FF2B5EF4-FFF2-40B4-BE49-F238E27FC236}">
+                <a16:creationId xmlns:a16="http://schemas.microsoft.com/office/drawing/2014/main" id="{E1967DEC-4A45-4F02-8D1B-25B4AAB039CE}"/>
+              </a:ext>
+            </a:extLst>
+          </p:cNvPr>
+          <p:cNvSpPr/>
+          <p:nvPr/>
+        </p:nvSpPr>
+        <p:spPr>
+          <a:xfrm>
+            <a:off x="10623738" y="4388194"/>
+            <a:ext cx="914400" cy="914400"/>
+          </a:xfrm>
+          <a:prstGeom prst="ellipse">
+            <a:avLst/>
+          </a:prstGeom>
+        </p:spPr>
+        <p:style>
+          <a:lnRef idx="2">
+            <a:schemeClr val="dk1">
+              <a:shade val="50000"/>
+            </a:schemeClr>
+          </a:lnRef>
+          <a:fillRef idx="1">
+            <a:schemeClr val="dk1"/>
+          </a:fillRef>
+          <a:effectRef idx="0">
+            <a:schemeClr val="dk1"/>
+          </a:effectRef>
+          <a:fontRef idx="minor">
+            <a:schemeClr val="lt1"/>
+          </a:fontRef>
+        </p:style>
+        <p:txBody>
+          <a:bodyPr rtlCol="0" anchor="ctr"/>
+          <a:lstStyle/>
+          <a:p>
+            <a:pPr algn="ctr"/>
+            <a:r>
+              <a:rPr lang="it-IT" sz="4400" b="1" dirty="0">
+                <a:latin typeface="Arial" panose="020B0604020202020204" pitchFamily="34" charset="0"/>
+                <a:cs typeface="Arial" panose="020B0604020202020204" pitchFamily="34" charset="0"/>
+              </a:rPr>
+              <a:t>T</a:t>
+            </a:r>
+          </a:p>
+        </p:txBody>
+      </p:sp>
+      <p:sp>
+        <p:nvSpPr>
+          <p:cNvPr id="6" name="Ovale 5">
+            <a:extLst>
+              <a:ext uri="{FF2B5EF4-FFF2-40B4-BE49-F238E27FC236}">
+                <a16:creationId xmlns:a16="http://schemas.microsoft.com/office/drawing/2014/main" id="{E6DD61D4-C468-4E75-B8C3-24963CD503F5}"/>
+              </a:ext>
+            </a:extLst>
+          </p:cNvPr>
+          <p:cNvSpPr/>
+          <p:nvPr/>
+        </p:nvSpPr>
+        <p:spPr>
+          <a:xfrm>
+            <a:off x="7032400" y="5302594"/>
+            <a:ext cx="914400" cy="914400"/>
+          </a:xfrm>
+          <a:prstGeom prst="ellipse">
+            <a:avLst/>
+          </a:prstGeom>
+        </p:spPr>
+        <p:style>
+          <a:lnRef idx="2">
+            <a:schemeClr val="dk1">
+              <a:shade val="50000"/>
+            </a:schemeClr>
+          </a:lnRef>
+          <a:fillRef idx="1">
+            <a:schemeClr val="dk1"/>
+          </a:fillRef>
+          <a:effectRef idx="0">
+            <a:schemeClr val="dk1"/>
+          </a:effectRef>
+          <a:fontRef idx="minor">
+            <a:schemeClr val="lt1"/>
+          </a:fontRef>
+        </p:style>
+        <p:txBody>
+          <a:bodyPr rtlCol="0" anchor="ctr"/>
+          <a:lstStyle/>
+          <a:p>
+            <a:pPr algn="ctr"/>
+            <a:r>
+              <a:rPr lang="it-IT" sz="4400" b="1" dirty="0">
+                <a:latin typeface="Arial" panose="020B0604020202020204" pitchFamily="34" charset="0"/>
+                <a:cs typeface="Arial" panose="020B0604020202020204" pitchFamily="34" charset="0"/>
+              </a:rPr>
+              <a:t>f</a:t>
+            </a:r>
+            <a:r>
+              <a:rPr lang="it-IT" sz="4400" b="1" baseline="-25000" dirty="0">
+                <a:latin typeface="Arial" panose="020B0604020202020204" pitchFamily="34" charset="0"/>
+                <a:cs typeface="Arial" panose="020B0604020202020204" pitchFamily="34" charset="0"/>
+              </a:rPr>
+              <a:t>1</a:t>
+            </a:r>
+          </a:p>
+        </p:txBody>
+      </p:sp>
+      <p:sp>
+        <p:nvSpPr>
+          <p:cNvPr id="7" name="Ovale 6">
+            <a:extLst>
+              <a:ext uri="{FF2B5EF4-FFF2-40B4-BE49-F238E27FC236}">
+                <a16:creationId xmlns:a16="http://schemas.microsoft.com/office/drawing/2014/main" id="{2B1DC6F1-EC57-4BA3-BAB9-7A73AF0CE5F3}"/>
+              </a:ext>
+            </a:extLst>
+          </p:cNvPr>
+          <p:cNvSpPr/>
+          <p:nvPr/>
+        </p:nvSpPr>
+        <p:spPr>
+          <a:xfrm>
+            <a:off x="3197224" y="5341124"/>
+            <a:ext cx="662777" cy="662777"/>
+          </a:xfrm>
+          <a:prstGeom prst="ellipse">
+            <a:avLst/>
+          </a:prstGeom>
+        </p:spPr>
+        <p:style>
+          <a:lnRef idx="2">
+            <a:schemeClr val="dk1">
+              <a:shade val="50000"/>
+            </a:schemeClr>
+          </a:lnRef>
+          <a:fillRef idx="1">
+            <a:schemeClr val="dk1"/>
+          </a:fillRef>
+          <a:effectRef idx="0">
+            <a:schemeClr val="dk1"/>
+          </a:effectRef>
+          <a:fontRef idx="minor">
+            <a:schemeClr val="lt1"/>
+          </a:fontRef>
+        </p:style>
+        <p:txBody>
+          <a:bodyPr rtlCol="0" anchor="ctr"/>
+          <a:lstStyle/>
+          <a:p>
+            <a:pPr algn="ctr"/>
+            <a:r>
+              <a:rPr lang="it-IT" sz="2400" b="1" dirty="0">
+                <a:latin typeface="Arial" panose="020B0604020202020204" pitchFamily="34" charset="0"/>
+                <a:cs typeface="Arial" panose="020B0604020202020204" pitchFamily="34" charset="0"/>
+              </a:rPr>
+              <a:t>1</a:t>
+            </a:r>
+          </a:p>
+          <a:p>
+            <a:pPr algn="ctr"/>
+            <a:r>
+              <a:rPr lang="it-IT" sz="1050" b="1" dirty="0">
+                <a:latin typeface="Arial" panose="020B0604020202020204" pitchFamily="34" charset="0"/>
+                <a:cs typeface="Arial" panose="020B0604020202020204" pitchFamily="34" charset="0"/>
+              </a:rPr>
+              <a:t>IN</a:t>
+            </a:r>
+          </a:p>
+        </p:txBody>
+      </p:sp>
+      <p:cxnSp>
+        <p:nvCxnSpPr>
+          <p:cNvPr id="20" name="Connettore 2 19">
+            <a:extLst>
+              <a:ext uri="{FF2B5EF4-FFF2-40B4-BE49-F238E27FC236}">
+                <a16:creationId xmlns:a16="http://schemas.microsoft.com/office/drawing/2014/main" id="{747C6FF4-5F8E-4BB3-B617-AA5F17BE76C0}"/>
+              </a:ext>
+            </a:extLst>
+          </p:cNvPr>
+          <p:cNvCxnSpPr>
+            <a:cxnSpLocks/>
+            <a:stCxn id="7" idx="6"/>
+            <a:endCxn id="6" idx="2"/>
+          </p:cNvCxnSpPr>
+          <p:nvPr/>
+        </p:nvCxnSpPr>
+        <p:spPr>
+          <a:xfrm>
+            <a:off x="3860001" y="5672513"/>
+            <a:ext cx="3172399" cy="87281"/>
+          </a:xfrm>
+          <a:prstGeom prst="straightConnector1">
+            <a:avLst/>
+          </a:prstGeom>
+          <a:ln>
+            <a:tailEnd type="triangle"/>
+          </a:ln>
+        </p:spPr>
+        <p:style>
+          <a:lnRef idx="1">
+            <a:schemeClr val="dk1"/>
+          </a:lnRef>
+          <a:fillRef idx="0">
+            <a:schemeClr val="dk1"/>
+          </a:fillRef>
+          <a:effectRef idx="0">
+            <a:schemeClr val="dk1"/>
+          </a:effectRef>
+          <a:fontRef idx="minor">
+            <a:schemeClr val="tx1"/>
+          </a:fontRef>
+        </p:style>
+      </p:cxnSp>
+      <p:cxnSp>
+        <p:nvCxnSpPr>
+          <p:cNvPr id="50" name="Connettore 2 49">
+            <a:extLst>
+              <a:ext uri="{FF2B5EF4-FFF2-40B4-BE49-F238E27FC236}">
+                <a16:creationId xmlns:a16="http://schemas.microsoft.com/office/drawing/2014/main" id="{DA2CEEFF-3389-4175-9E23-E9EEE9770376}"/>
+              </a:ext>
+            </a:extLst>
+          </p:cNvPr>
+          <p:cNvCxnSpPr>
+            <a:cxnSpLocks/>
+            <a:stCxn id="4" idx="4"/>
+            <a:endCxn id="7" idx="2"/>
+          </p:cNvCxnSpPr>
+          <p:nvPr/>
+        </p:nvCxnSpPr>
+        <p:spPr>
+          <a:xfrm>
+            <a:off x="483450" y="5302594"/>
+            <a:ext cx="2713774" cy="369919"/>
+          </a:xfrm>
+          <a:prstGeom prst="straightConnector1">
+            <a:avLst/>
+          </a:prstGeom>
+          <a:ln>
+            <a:tailEnd type="triangle"/>
+          </a:ln>
+        </p:spPr>
+        <p:style>
+          <a:lnRef idx="1">
+            <a:schemeClr val="dk1"/>
+          </a:lnRef>
+          <a:fillRef idx="0">
+            <a:schemeClr val="dk1"/>
+          </a:fillRef>
+          <a:effectRef idx="0">
+            <a:schemeClr val="dk1"/>
+          </a:effectRef>
+          <a:fontRef idx="minor">
+            <a:schemeClr val="tx1"/>
+          </a:fontRef>
+        </p:style>
+      </p:cxnSp>
+      <p:cxnSp>
+        <p:nvCxnSpPr>
+          <p:cNvPr id="71" name="Connettore 2 70">
+            <a:extLst>
+              <a:ext uri="{FF2B5EF4-FFF2-40B4-BE49-F238E27FC236}">
+                <a16:creationId xmlns:a16="http://schemas.microsoft.com/office/drawing/2014/main" id="{CE884218-2B43-4695-B24F-26EF5C5A4A53}"/>
+              </a:ext>
+            </a:extLst>
+          </p:cNvPr>
+          <p:cNvCxnSpPr>
+            <a:cxnSpLocks/>
+            <a:stCxn id="6" idx="6"/>
+            <a:endCxn id="5" idx="3"/>
+          </p:cNvCxnSpPr>
+          <p:nvPr/>
+        </p:nvCxnSpPr>
+        <p:spPr>
+          <a:xfrm flipV="1">
+            <a:off x="7946800" y="5168683"/>
+            <a:ext cx="2810849" cy="591111"/>
+          </a:xfrm>
+          <a:prstGeom prst="straightConnector1">
+            <a:avLst/>
+          </a:prstGeom>
+          <a:ln>
+            <a:tailEnd type="triangle"/>
+          </a:ln>
+        </p:spPr>
+        <p:style>
+          <a:lnRef idx="1">
+            <a:schemeClr val="dk1"/>
+          </a:lnRef>
+          <a:fillRef idx="0">
+            <a:schemeClr val="dk1"/>
+          </a:fillRef>
+          <a:effectRef idx="0">
+            <a:schemeClr val="dk1"/>
+          </a:effectRef>
+          <a:fontRef idx="minor">
+            <a:schemeClr val="tx1"/>
+          </a:fontRef>
+        </p:style>
+      </p:cxnSp>
+      <p:cxnSp>
+        <p:nvCxnSpPr>
+          <p:cNvPr id="75" name="Connettore 2 74">
+            <a:extLst>
+              <a:ext uri="{FF2B5EF4-FFF2-40B4-BE49-F238E27FC236}">
+                <a16:creationId xmlns:a16="http://schemas.microsoft.com/office/drawing/2014/main" id="{6F0A0B95-C4B5-4281-B140-6D28F88C3957}"/>
+              </a:ext>
+            </a:extLst>
+          </p:cNvPr>
+          <p:cNvCxnSpPr>
+            <a:cxnSpLocks/>
+            <a:stCxn id="6" idx="1"/>
+            <a:endCxn id="127" idx="5"/>
+          </p:cNvCxnSpPr>
+          <p:nvPr/>
+        </p:nvCxnSpPr>
+        <p:spPr>
+          <a:xfrm flipH="1" flipV="1">
+            <a:off x="6210109" y="5079721"/>
+            <a:ext cx="956202" cy="356784"/>
+          </a:xfrm>
+          <a:prstGeom prst="straightConnector1">
+            <a:avLst/>
+          </a:prstGeom>
+          <a:ln>
+            <a:tailEnd type="triangle"/>
+          </a:ln>
+        </p:spPr>
+        <p:style>
+          <a:lnRef idx="1">
+            <a:schemeClr val="dk1"/>
+          </a:lnRef>
+          <a:fillRef idx="0">
+            <a:schemeClr val="dk1"/>
+          </a:fillRef>
+          <a:effectRef idx="0">
+            <a:schemeClr val="dk1"/>
+          </a:effectRef>
+          <a:fontRef idx="minor">
+            <a:schemeClr val="tx1"/>
+          </a:fontRef>
+        </p:style>
+      </p:cxnSp>
+      <p:sp>
+        <p:nvSpPr>
+          <p:cNvPr id="88" name="Ovale 87">
+            <a:extLst>
+              <a:ext uri="{FF2B5EF4-FFF2-40B4-BE49-F238E27FC236}">
+                <a16:creationId xmlns:a16="http://schemas.microsoft.com/office/drawing/2014/main" id="{1C971638-4413-484B-A126-4E20D788BB3F}"/>
+              </a:ext>
+            </a:extLst>
+          </p:cNvPr>
+          <p:cNvSpPr/>
+          <p:nvPr/>
+        </p:nvSpPr>
+        <p:spPr>
+          <a:xfrm>
+            <a:off x="5530634" y="243833"/>
+            <a:ext cx="914400" cy="914400"/>
+          </a:xfrm>
+          <a:prstGeom prst="ellipse">
+            <a:avLst/>
+          </a:prstGeom>
+        </p:spPr>
+        <p:style>
+          <a:lnRef idx="2">
+            <a:schemeClr val="dk1">
+              <a:shade val="50000"/>
+            </a:schemeClr>
+          </a:lnRef>
+          <a:fillRef idx="1">
+            <a:schemeClr val="dk1"/>
+          </a:fillRef>
+          <a:effectRef idx="0">
+            <a:schemeClr val="dk1"/>
+          </a:effectRef>
+          <a:fontRef idx="minor">
+            <a:schemeClr val="lt1"/>
+          </a:fontRef>
+        </p:style>
+        <p:txBody>
+          <a:bodyPr rtlCol="0" anchor="ctr"/>
+          <a:lstStyle/>
+          <a:p>
+            <a:pPr algn="ctr"/>
+            <a:r>
+              <a:rPr lang="it-IT" sz="4400" b="1" dirty="0">
+                <a:latin typeface="Arial" panose="020B0604020202020204" pitchFamily="34" charset="0"/>
+                <a:cs typeface="Arial" panose="020B0604020202020204" pitchFamily="34" charset="0"/>
+              </a:rPr>
+              <a:t>f</a:t>
+            </a:r>
+            <a:r>
+              <a:rPr lang="it-IT" sz="4400" b="1" baseline="-25000" dirty="0">
+                <a:latin typeface="Arial" panose="020B0604020202020204" pitchFamily="34" charset="0"/>
+                <a:cs typeface="Arial" panose="020B0604020202020204" pitchFamily="34" charset="0"/>
+              </a:rPr>
+              <a:t>2</a:t>
+            </a:r>
+          </a:p>
+        </p:txBody>
+      </p:sp>
+      <p:cxnSp>
+        <p:nvCxnSpPr>
+          <p:cNvPr id="90" name="Connettore 2 89">
+            <a:extLst>
+              <a:ext uri="{FF2B5EF4-FFF2-40B4-BE49-F238E27FC236}">
+                <a16:creationId xmlns:a16="http://schemas.microsoft.com/office/drawing/2014/main" id="{BD31938C-E45B-421B-A8F8-CDF21F35C8A6}"/>
+              </a:ext>
+            </a:extLst>
+          </p:cNvPr>
+          <p:cNvCxnSpPr>
+            <a:cxnSpLocks/>
+            <a:stCxn id="131" idx="6"/>
+            <a:endCxn id="88" idx="2"/>
+          </p:cNvCxnSpPr>
+          <p:nvPr/>
+        </p:nvCxnSpPr>
+        <p:spPr>
+          <a:xfrm flipV="1">
+            <a:off x="2927558" y="701033"/>
+            <a:ext cx="2603076" cy="235721"/>
+          </a:xfrm>
+          <a:prstGeom prst="straightConnector1">
+            <a:avLst/>
+          </a:prstGeom>
+          <a:ln>
+            <a:tailEnd type="triangle"/>
+          </a:ln>
+        </p:spPr>
+        <p:style>
+          <a:lnRef idx="1">
+            <a:schemeClr val="dk1"/>
+          </a:lnRef>
+          <a:fillRef idx="0">
+            <a:schemeClr val="dk1"/>
+          </a:fillRef>
+          <a:effectRef idx="0">
+            <a:schemeClr val="dk1"/>
+          </a:effectRef>
+          <a:fontRef idx="minor">
+            <a:schemeClr val="tx1"/>
+          </a:fontRef>
+        </p:style>
+      </p:cxnSp>
+      <p:cxnSp>
+        <p:nvCxnSpPr>
+          <p:cNvPr id="91" name="Connettore 2 90">
+            <a:extLst>
+              <a:ext uri="{FF2B5EF4-FFF2-40B4-BE49-F238E27FC236}">
+                <a16:creationId xmlns:a16="http://schemas.microsoft.com/office/drawing/2014/main" id="{B714F6C6-9DD4-48FB-B985-5D6777E94485}"/>
+              </a:ext>
+            </a:extLst>
+          </p:cNvPr>
+          <p:cNvCxnSpPr>
+            <a:cxnSpLocks/>
+            <a:stCxn id="4" idx="7"/>
+            <a:endCxn id="131" idx="2"/>
+          </p:cNvCxnSpPr>
+          <p:nvPr/>
+        </p:nvCxnSpPr>
+        <p:spPr>
+          <a:xfrm flipV="1">
+            <a:off x="806739" y="936754"/>
+            <a:ext cx="1458042" cy="3585351"/>
+          </a:xfrm>
+          <a:prstGeom prst="straightConnector1">
+            <a:avLst/>
+          </a:prstGeom>
+          <a:ln>
+            <a:tailEnd type="triangle"/>
+          </a:ln>
+        </p:spPr>
+        <p:style>
+          <a:lnRef idx="1">
+            <a:schemeClr val="dk1"/>
+          </a:lnRef>
+          <a:fillRef idx="0">
+            <a:schemeClr val="dk1"/>
+          </a:fillRef>
+          <a:effectRef idx="0">
+            <a:schemeClr val="dk1"/>
+          </a:effectRef>
+          <a:fontRef idx="minor">
+            <a:schemeClr val="tx1"/>
+          </a:fontRef>
+        </p:style>
+      </p:cxnSp>
+      <p:cxnSp>
+        <p:nvCxnSpPr>
+          <p:cNvPr id="93" name="Connettore 2 92">
+            <a:extLst>
+              <a:ext uri="{FF2B5EF4-FFF2-40B4-BE49-F238E27FC236}">
+                <a16:creationId xmlns:a16="http://schemas.microsoft.com/office/drawing/2014/main" id="{ACB4B42E-540F-4F33-B981-40A3101A36B9}"/>
+              </a:ext>
+            </a:extLst>
+          </p:cNvPr>
+          <p:cNvCxnSpPr>
+            <a:cxnSpLocks/>
+            <a:stCxn id="88" idx="6"/>
+            <a:endCxn id="5" idx="1"/>
+          </p:cNvCxnSpPr>
+          <p:nvPr/>
+        </p:nvCxnSpPr>
+        <p:spPr>
+          <a:xfrm>
+            <a:off x="6445034" y="701033"/>
+            <a:ext cx="4312615" cy="3821072"/>
+          </a:xfrm>
+          <a:prstGeom prst="straightConnector1">
+            <a:avLst/>
+          </a:prstGeom>
+          <a:ln>
+            <a:tailEnd type="triangle"/>
+          </a:ln>
+        </p:spPr>
+        <p:style>
+          <a:lnRef idx="1">
+            <a:schemeClr val="dk1"/>
+          </a:lnRef>
+          <a:fillRef idx="0">
+            <a:schemeClr val="dk1"/>
+          </a:fillRef>
+          <a:effectRef idx="0">
+            <a:schemeClr val="dk1"/>
+          </a:effectRef>
+          <a:fontRef idx="minor">
+            <a:schemeClr val="tx1"/>
+          </a:fontRef>
+        </p:style>
+      </p:cxnSp>
+      <p:cxnSp>
+        <p:nvCxnSpPr>
+          <p:cNvPr id="94" name="Connettore 2 93">
+            <a:extLst>
+              <a:ext uri="{FF2B5EF4-FFF2-40B4-BE49-F238E27FC236}">
+                <a16:creationId xmlns:a16="http://schemas.microsoft.com/office/drawing/2014/main" id="{414F78C7-D3FC-4129-B030-AAE76E9841A4}"/>
+              </a:ext>
+            </a:extLst>
+          </p:cNvPr>
+          <p:cNvCxnSpPr>
+            <a:cxnSpLocks/>
+            <a:stCxn id="88" idx="3"/>
+            <a:endCxn id="133" idx="0"/>
+          </p:cNvCxnSpPr>
+          <p:nvPr/>
+        </p:nvCxnSpPr>
+        <p:spPr>
+          <a:xfrm flipH="1">
+            <a:off x="5530634" y="1024322"/>
+            <a:ext cx="133911" cy="552654"/>
+          </a:xfrm>
+          <a:prstGeom prst="straightConnector1">
+            <a:avLst/>
+          </a:prstGeom>
+          <a:ln>
+            <a:tailEnd type="triangle"/>
+          </a:ln>
+        </p:spPr>
+        <p:style>
+          <a:lnRef idx="1">
+            <a:schemeClr val="dk1"/>
+          </a:lnRef>
+          <a:fillRef idx="0">
+            <a:schemeClr val="dk1"/>
+          </a:fillRef>
+          <a:effectRef idx="0">
+            <a:schemeClr val="dk1"/>
+          </a:effectRef>
+          <a:fontRef idx="minor">
+            <a:schemeClr val="tx1"/>
+          </a:fontRef>
+        </p:style>
+      </p:cxnSp>
+      <p:sp>
+        <p:nvSpPr>
+          <p:cNvPr id="127" name="Ovale 126">
+            <a:extLst>
+              <a:ext uri="{FF2B5EF4-FFF2-40B4-BE49-F238E27FC236}">
+                <a16:creationId xmlns:a16="http://schemas.microsoft.com/office/drawing/2014/main" id="{A815A1F0-7CE8-4A59-A9FC-8718DF84AE4C}"/>
+              </a:ext>
+            </a:extLst>
+          </p:cNvPr>
+          <p:cNvSpPr/>
+          <p:nvPr/>
+        </p:nvSpPr>
+        <p:spPr>
+          <a:xfrm>
+            <a:off x="5644393" y="4514005"/>
+            <a:ext cx="662777" cy="662777"/>
+          </a:xfrm>
+          <a:prstGeom prst="ellipse">
+            <a:avLst/>
+          </a:prstGeom>
+        </p:spPr>
+        <p:style>
+          <a:lnRef idx="2">
+            <a:schemeClr val="dk1">
+              <a:shade val="50000"/>
+            </a:schemeClr>
+          </a:lnRef>
+          <a:fillRef idx="1">
+            <a:schemeClr val="dk1"/>
+          </a:fillRef>
+          <a:effectRef idx="0">
+            <a:schemeClr val="dk1"/>
+          </a:effectRef>
+          <a:fontRef idx="minor">
+            <a:schemeClr val="lt1"/>
+          </a:fontRef>
+        </p:style>
+        <p:txBody>
+          <a:bodyPr rtlCol="0" anchor="ctr"/>
+          <a:lstStyle/>
+          <a:p>
+            <a:pPr algn="ctr"/>
+            <a:r>
+              <a:rPr lang="it-IT" sz="2400" b="1" dirty="0">
+                <a:latin typeface="Arial" panose="020B0604020202020204" pitchFamily="34" charset="0"/>
+                <a:cs typeface="Arial" panose="020B0604020202020204" pitchFamily="34" charset="0"/>
+              </a:rPr>
+              <a:t>1</a:t>
+            </a:r>
+          </a:p>
+          <a:p>
+            <a:pPr algn="ctr"/>
+            <a:r>
+              <a:rPr lang="it-IT" sz="1050" b="1" dirty="0">
+                <a:latin typeface="Arial" panose="020B0604020202020204" pitchFamily="34" charset="0"/>
+                <a:cs typeface="Arial" panose="020B0604020202020204" pitchFamily="34" charset="0"/>
+              </a:rPr>
+              <a:t>OUT</a:t>
+            </a:r>
+          </a:p>
+        </p:txBody>
+      </p:sp>
+      <p:sp>
+        <p:nvSpPr>
+          <p:cNvPr id="131" name="Ovale 130">
+            <a:extLst>
+              <a:ext uri="{FF2B5EF4-FFF2-40B4-BE49-F238E27FC236}">
+                <a16:creationId xmlns:a16="http://schemas.microsoft.com/office/drawing/2014/main" id="{82927730-6352-48C2-BF63-C869121FAE37}"/>
+              </a:ext>
+            </a:extLst>
+          </p:cNvPr>
+          <p:cNvSpPr/>
+          <p:nvPr/>
+        </p:nvSpPr>
+        <p:spPr>
+          <a:xfrm>
+            <a:off x="2264781" y="605365"/>
+            <a:ext cx="662777" cy="662777"/>
+          </a:xfrm>
+          <a:prstGeom prst="ellipse">
+            <a:avLst/>
+          </a:prstGeom>
+        </p:spPr>
+        <p:style>
+          <a:lnRef idx="2">
+            <a:schemeClr val="dk1">
+              <a:shade val="50000"/>
+            </a:schemeClr>
+          </a:lnRef>
+          <a:fillRef idx="1">
+            <a:schemeClr val="dk1"/>
+          </a:fillRef>
+          <a:effectRef idx="0">
+            <a:schemeClr val="dk1"/>
+          </a:effectRef>
+          <a:fontRef idx="minor">
+            <a:schemeClr val="lt1"/>
+          </a:fontRef>
+        </p:style>
+        <p:txBody>
+          <a:bodyPr rtlCol="0" anchor="ctr"/>
+          <a:lstStyle/>
+          <a:p>
+            <a:pPr algn="ctr"/>
+            <a:r>
+              <a:rPr lang="it-IT" sz="2400" b="1" dirty="0">
+                <a:latin typeface="Arial" panose="020B0604020202020204" pitchFamily="34" charset="0"/>
+                <a:cs typeface="Arial" panose="020B0604020202020204" pitchFamily="34" charset="0"/>
+              </a:rPr>
+              <a:t>2</a:t>
+            </a:r>
+          </a:p>
+          <a:p>
+            <a:pPr algn="ctr"/>
+            <a:r>
+              <a:rPr lang="it-IT" sz="1050" b="1" dirty="0">
+                <a:latin typeface="Arial" panose="020B0604020202020204" pitchFamily="34" charset="0"/>
+                <a:cs typeface="Arial" panose="020B0604020202020204" pitchFamily="34" charset="0"/>
+              </a:rPr>
+              <a:t>IN</a:t>
+            </a:r>
+          </a:p>
+        </p:txBody>
+      </p:sp>
+      <p:sp>
+        <p:nvSpPr>
+          <p:cNvPr id="133" name="Ovale 132">
+            <a:extLst>
+              <a:ext uri="{FF2B5EF4-FFF2-40B4-BE49-F238E27FC236}">
+                <a16:creationId xmlns:a16="http://schemas.microsoft.com/office/drawing/2014/main" id="{2F492822-F8FD-4AF7-8EB0-500CB4E5CBDA}"/>
+              </a:ext>
+            </a:extLst>
+          </p:cNvPr>
+          <p:cNvSpPr/>
+          <p:nvPr/>
+        </p:nvSpPr>
+        <p:spPr>
+          <a:xfrm>
+            <a:off x="5199245" y="1576976"/>
+            <a:ext cx="662777" cy="662777"/>
+          </a:xfrm>
+          <a:prstGeom prst="ellipse">
+            <a:avLst/>
+          </a:prstGeom>
+        </p:spPr>
+        <p:style>
+          <a:lnRef idx="2">
+            <a:schemeClr val="dk1">
+              <a:shade val="50000"/>
+            </a:schemeClr>
+          </a:lnRef>
+          <a:fillRef idx="1">
+            <a:schemeClr val="dk1"/>
+          </a:fillRef>
+          <a:effectRef idx="0">
+            <a:schemeClr val="dk1"/>
+          </a:effectRef>
+          <a:fontRef idx="minor">
+            <a:schemeClr val="lt1"/>
+          </a:fontRef>
+        </p:style>
+        <p:txBody>
+          <a:bodyPr rtlCol="0" anchor="ctr"/>
+          <a:lstStyle/>
+          <a:p>
+            <a:pPr algn="ctr"/>
+            <a:r>
+              <a:rPr lang="it-IT" sz="2400" b="1" dirty="0">
+                <a:latin typeface="Arial" panose="020B0604020202020204" pitchFamily="34" charset="0"/>
+                <a:cs typeface="Arial" panose="020B0604020202020204" pitchFamily="34" charset="0"/>
+              </a:rPr>
+              <a:t>2</a:t>
+            </a:r>
+          </a:p>
+          <a:p>
+            <a:pPr algn="ctr"/>
+            <a:r>
+              <a:rPr lang="it-IT" sz="1050" b="1" dirty="0">
+                <a:latin typeface="Arial" panose="020B0604020202020204" pitchFamily="34" charset="0"/>
+                <a:cs typeface="Arial" panose="020B0604020202020204" pitchFamily="34" charset="0"/>
+              </a:rPr>
+              <a:t>OUT</a:t>
+            </a:r>
+          </a:p>
+        </p:txBody>
+      </p:sp>
+      <p:sp>
+        <p:nvSpPr>
+          <p:cNvPr id="148" name="Ovale 147">
+            <a:extLst>
+              <a:ext uri="{FF2B5EF4-FFF2-40B4-BE49-F238E27FC236}">
+                <a16:creationId xmlns:a16="http://schemas.microsoft.com/office/drawing/2014/main" id="{D5164C21-C2CF-436B-B292-EF0129A7F20A}"/>
+              </a:ext>
+            </a:extLst>
+          </p:cNvPr>
+          <p:cNvSpPr/>
+          <p:nvPr/>
+        </p:nvSpPr>
+        <p:spPr>
+          <a:xfrm>
+            <a:off x="2162383" y="2963901"/>
+            <a:ext cx="914400" cy="914400"/>
+          </a:xfrm>
+          <a:prstGeom prst="ellipse">
+            <a:avLst/>
+          </a:prstGeom>
+        </p:spPr>
+        <p:style>
+          <a:lnRef idx="2">
+            <a:schemeClr val="dk1">
+              <a:shade val="50000"/>
+            </a:schemeClr>
+          </a:lnRef>
+          <a:fillRef idx="1">
+            <a:schemeClr val="dk1"/>
+          </a:fillRef>
+          <a:effectRef idx="0">
+            <a:schemeClr val="dk1"/>
+          </a:effectRef>
+          <a:fontRef idx="minor">
+            <a:schemeClr val="lt1"/>
+          </a:fontRef>
+        </p:style>
+        <p:txBody>
+          <a:bodyPr rtlCol="0" anchor="ctr"/>
+          <a:lstStyle/>
+          <a:p>
+            <a:pPr algn="ctr"/>
+            <a:r>
+              <a:rPr lang="it-IT" sz="4400" b="1" dirty="0">
+                <a:latin typeface="Arial" panose="020B0604020202020204" pitchFamily="34" charset="0"/>
+                <a:cs typeface="Arial" panose="020B0604020202020204" pitchFamily="34" charset="0"/>
+              </a:rPr>
+              <a:t>f</a:t>
+            </a:r>
+            <a:r>
+              <a:rPr lang="it-IT" sz="4400" b="1" baseline="-25000" dirty="0">
+                <a:latin typeface="Arial" panose="020B0604020202020204" pitchFamily="34" charset="0"/>
+                <a:cs typeface="Arial" panose="020B0604020202020204" pitchFamily="34" charset="0"/>
+              </a:rPr>
+              <a:t>3</a:t>
+            </a:r>
+          </a:p>
+        </p:txBody>
+      </p:sp>
+      <p:cxnSp>
+        <p:nvCxnSpPr>
+          <p:cNvPr id="149" name="Connettore 2 148">
+            <a:extLst>
+              <a:ext uri="{FF2B5EF4-FFF2-40B4-BE49-F238E27FC236}">
+                <a16:creationId xmlns:a16="http://schemas.microsoft.com/office/drawing/2014/main" id="{4C9818E0-0771-4071-941A-3D2940FB88EF}"/>
+              </a:ext>
+            </a:extLst>
+          </p:cNvPr>
+          <p:cNvCxnSpPr>
+            <a:cxnSpLocks/>
+            <a:stCxn id="151" idx="6"/>
+            <a:endCxn id="148" idx="7"/>
+          </p:cNvCxnSpPr>
+          <p:nvPr/>
+        </p:nvCxnSpPr>
+        <p:spPr>
+          <a:xfrm flipH="1">
+            <a:off x="2942872" y="2956020"/>
+            <a:ext cx="2082211" cy="141792"/>
+          </a:xfrm>
+          <a:prstGeom prst="straightConnector1">
+            <a:avLst/>
+          </a:prstGeom>
+          <a:ln>
+            <a:tailEnd type="triangle"/>
+          </a:ln>
+        </p:spPr>
+        <p:style>
+          <a:lnRef idx="1">
+            <a:schemeClr val="dk1"/>
+          </a:lnRef>
+          <a:fillRef idx="0">
+            <a:schemeClr val="dk1"/>
+          </a:fillRef>
+          <a:effectRef idx="0">
+            <a:schemeClr val="dk1"/>
+          </a:effectRef>
+          <a:fontRef idx="minor">
+            <a:schemeClr val="tx1"/>
+          </a:fontRef>
+        </p:style>
+      </p:cxnSp>
+      <p:cxnSp>
+        <p:nvCxnSpPr>
+          <p:cNvPr id="150" name="Connettore 2 149">
+            <a:extLst>
+              <a:ext uri="{FF2B5EF4-FFF2-40B4-BE49-F238E27FC236}">
+                <a16:creationId xmlns:a16="http://schemas.microsoft.com/office/drawing/2014/main" id="{52E2E53B-1CF8-4944-B714-683DE2F1CCC5}"/>
+              </a:ext>
+            </a:extLst>
+          </p:cNvPr>
+          <p:cNvCxnSpPr>
+            <a:cxnSpLocks/>
+            <a:stCxn id="148" idx="0"/>
+            <a:endCxn id="152" idx="3"/>
+          </p:cNvCxnSpPr>
+          <p:nvPr/>
+        </p:nvCxnSpPr>
+        <p:spPr>
+          <a:xfrm flipV="1">
+            <a:off x="2619583" y="2523995"/>
+            <a:ext cx="411102" cy="439906"/>
+          </a:xfrm>
+          <a:prstGeom prst="straightConnector1">
+            <a:avLst/>
+          </a:prstGeom>
+          <a:ln>
+            <a:tailEnd type="triangle"/>
+          </a:ln>
+        </p:spPr>
+        <p:style>
+          <a:lnRef idx="1">
+            <a:schemeClr val="dk1"/>
+          </a:lnRef>
+          <a:fillRef idx="0">
+            <a:schemeClr val="dk1"/>
+          </a:fillRef>
+          <a:effectRef idx="0">
+            <a:schemeClr val="dk1"/>
+          </a:effectRef>
+          <a:fontRef idx="minor">
+            <a:schemeClr val="tx1"/>
+          </a:fontRef>
+        </p:style>
+      </p:cxnSp>
+      <p:sp>
+        <p:nvSpPr>
+          <p:cNvPr id="151" name="Ovale 150">
+            <a:extLst>
+              <a:ext uri="{FF2B5EF4-FFF2-40B4-BE49-F238E27FC236}">
+                <a16:creationId xmlns:a16="http://schemas.microsoft.com/office/drawing/2014/main" id="{A32C6C7E-7062-4CA9-8B74-F4C11682B213}"/>
+              </a:ext>
+            </a:extLst>
+          </p:cNvPr>
+          <p:cNvSpPr/>
+          <p:nvPr/>
+        </p:nvSpPr>
+        <p:spPr>
+          <a:xfrm>
+            <a:off x="4362306" y="2624631"/>
+            <a:ext cx="662777" cy="662777"/>
+          </a:xfrm>
+          <a:prstGeom prst="ellipse">
+            <a:avLst/>
+          </a:prstGeom>
+        </p:spPr>
+        <p:style>
+          <a:lnRef idx="2">
+            <a:schemeClr val="dk1">
+              <a:shade val="50000"/>
+            </a:schemeClr>
+          </a:lnRef>
+          <a:fillRef idx="1">
+            <a:schemeClr val="dk1"/>
+          </a:fillRef>
+          <a:effectRef idx="0">
+            <a:schemeClr val="dk1"/>
+          </a:effectRef>
+          <a:fontRef idx="minor">
+            <a:schemeClr val="lt1"/>
+          </a:fontRef>
+        </p:style>
+        <p:txBody>
+          <a:bodyPr rtlCol="0" anchor="ctr"/>
+          <a:lstStyle/>
+          <a:p>
+            <a:pPr algn="ctr"/>
+            <a:r>
+              <a:rPr lang="it-IT" sz="2400" b="1" dirty="0">
+                <a:latin typeface="Arial" panose="020B0604020202020204" pitchFamily="34" charset="0"/>
+                <a:cs typeface="Arial" panose="020B0604020202020204" pitchFamily="34" charset="0"/>
+              </a:rPr>
+              <a:t>3</a:t>
+            </a:r>
+          </a:p>
+          <a:p>
+            <a:pPr algn="ctr"/>
+            <a:r>
+              <a:rPr lang="it-IT" sz="1050" b="1" dirty="0">
+                <a:latin typeface="Arial" panose="020B0604020202020204" pitchFamily="34" charset="0"/>
+                <a:cs typeface="Arial" panose="020B0604020202020204" pitchFamily="34" charset="0"/>
+              </a:rPr>
+              <a:t>IN</a:t>
+            </a:r>
+          </a:p>
+        </p:txBody>
+      </p:sp>
+      <p:sp>
+        <p:nvSpPr>
+          <p:cNvPr id="152" name="Ovale 151">
+            <a:extLst>
+              <a:ext uri="{FF2B5EF4-FFF2-40B4-BE49-F238E27FC236}">
+                <a16:creationId xmlns:a16="http://schemas.microsoft.com/office/drawing/2014/main" id="{226F1158-B903-426D-AE9D-6155A2DACA00}"/>
+              </a:ext>
+            </a:extLst>
+          </p:cNvPr>
+          <p:cNvSpPr/>
+          <p:nvPr/>
+        </p:nvSpPr>
+        <p:spPr>
+          <a:xfrm>
+            <a:off x="2933624" y="1958279"/>
+            <a:ext cx="662777" cy="662777"/>
+          </a:xfrm>
+          <a:prstGeom prst="ellipse">
+            <a:avLst/>
+          </a:prstGeom>
+        </p:spPr>
+        <p:style>
+          <a:lnRef idx="2">
+            <a:schemeClr val="dk1">
+              <a:shade val="50000"/>
+            </a:schemeClr>
+          </a:lnRef>
+          <a:fillRef idx="1">
+            <a:schemeClr val="dk1"/>
+          </a:fillRef>
+          <a:effectRef idx="0">
+            <a:schemeClr val="dk1"/>
+          </a:effectRef>
+          <a:fontRef idx="minor">
+            <a:schemeClr val="lt1"/>
+          </a:fontRef>
+        </p:style>
+        <p:txBody>
+          <a:bodyPr rtlCol="0" anchor="ctr"/>
+          <a:lstStyle/>
+          <a:p>
+            <a:pPr algn="ctr"/>
+            <a:r>
+              <a:rPr lang="it-IT" sz="2400" b="1" dirty="0">
+                <a:latin typeface="Arial" panose="020B0604020202020204" pitchFamily="34" charset="0"/>
+                <a:cs typeface="Arial" panose="020B0604020202020204" pitchFamily="34" charset="0"/>
+              </a:rPr>
+              <a:t>3</a:t>
+            </a:r>
+          </a:p>
+          <a:p>
+            <a:pPr algn="ctr"/>
+            <a:r>
+              <a:rPr lang="it-IT" sz="1050" b="1" dirty="0">
+                <a:latin typeface="Arial" panose="020B0604020202020204" pitchFamily="34" charset="0"/>
+                <a:cs typeface="Arial" panose="020B0604020202020204" pitchFamily="34" charset="0"/>
+              </a:rPr>
+              <a:t>OUT</a:t>
+            </a:r>
+          </a:p>
+        </p:txBody>
+      </p:sp>
+      <p:sp>
+        <p:nvSpPr>
+          <p:cNvPr id="153" name="Ovale 152">
+            <a:extLst>
+              <a:ext uri="{FF2B5EF4-FFF2-40B4-BE49-F238E27FC236}">
+                <a16:creationId xmlns:a16="http://schemas.microsoft.com/office/drawing/2014/main" id="{C95F07C5-FE8A-42B2-BB75-B3B5FA9D93F6}"/>
+              </a:ext>
+            </a:extLst>
+          </p:cNvPr>
+          <p:cNvSpPr/>
+          <p:nvPr/>
+        </p:nvSpPr>
+        <p:spPr>
+          <a:xfrm>
+            <a:off x="10337086" y="434076"/>
+            <a:ext cx="914400" cy="914400"/>
+          </a:xfrm>
+          <a:prstGeom prst="ellipse">
+            <a:avLst/>
+          </a:prstGeom>
+        </p:spPr>
+        <p:style>
+          <a:lnRef idx="2">
+            <a:schemeClr val="dk1">
+              <a:shade val="50000"/>
+            </a:schemeClr>
+          </a:lnRef>
+          <a:fillRef idx="1">
+            <a:schemeClr val="dk1"/>
+          </a:fillRef>
+          <a:effectRef idx="0">
+            <a:schemeClr val="dk1"/>
+          </a:effectRef>
+          <a:fontRef idx="minor">
+            <a:schemeClr val="lt1"/>
+          </a:fontRef>
+        </p:style>
+        <p:txBody>
+          <a:bodyPr rtlCol="0" anchor="ctr"/>
+          <a:lstStyle/>
+          <a:p>
+            <a:pPr algn="ctr"/>
+            <a:r>
+              <a:rPr lang="it-IT" sz="4400" b="1" dirty="0">
+                <a:latin typeface="Arial" panose="020B0604020202020204" pitchFamily="34" charset="0"/>
+                <a:cs typeface="Arial" panose="020B0604020202020204" pitchFamily="34" charset="0"/>
+              </a:rPr>
+              <a:t>f</a:t>
+            </a:r>
+            <a:r>
+              <a:rPr lang="it-IT" sz="4400" b="1" baseline="-25000" dirty="0">
+                <a:latin typeface="Arial" panose="020B0604020202020204" pitchFamily="34" charset="0"/>
+                <a:cs typeface="Arial" panose="020B0604020202020204" pitchFamily="34" charset="0"/>
+              </a:rPr>
+              <a:t>4</a:t>
+            </a:r>
+          </a:p>
+        </p:txBody>
+      </p:sp>
+      <p:cxnSp>
+        <p:nvCxnSpPr>
+          <p:cNvPr id="154" name="Connettore 2 153">
+            <a:extLst>
+              <a:ext uri="{FF2B5EF4-FFF2-40B4-BE49-F238E27FC236}">
+                <a16:creationId xmlns:a16="http://schemas.microsoft.com/office/drawing/2014/main" id="{451EA0D0-BD70-484F-A24F-8A6B9243824A}"/>
+              </a:ext>
+            </a:extLst>
+          </p:cNvPr>
+          <p:cNvCxnSpPr>
+            <a:cxnSpLocks/>
+            <a:stCxn id="156" idx="6"/>
+            <a:endCxn id="153" idx="2"/>
+          </p:cNvCxnSpPr>
+          <p:nvPr/>
+        </p:nvCxnSpPr>
+        <p:spPr>
+          <a:xfrm>
+            <a:off x="8742640" y="773268"/>
+            <a:ext cx="1594446" cy="118008"/>
+          </a:xfrm>
+          <a:prstGeom prst="straightConnector1">
+            <a:avLst/>
+          </a:prstGeom>
+          <a:ln>
+            <a:tailEnd type="triangle"/>
+          </a:ln>
+        </p:spPr>
+        <p:style>
+          <a:lnRef idx="1">
+            <a:schemeClr val="dk1"/>
+          </a:lnRef>
+          <a:fillRef idx="0">
+            <a:schemeClr val="dk1"/>
+          </a:fillRef>
+          <a:effectRef idx="0">
+            <a:schemeClr val="dk1"/>
+          </a:effectRef>
+          <a:fontRef idx="minor">
+            <a:schemeClr val="tx1"/>
+          </a:fontRef>
+        </p:style>
+      </p:cxnSp>
+      <p:cxnSp>
+        <p:nvCxnSpPr>
+          <p:cNvPr id="155" name="Connettore 2 154">
+            <a:extLst>
+              <a:ext uri="{FF2B5EF4-FFF2-40B4-BE49-F238E27FC236}">
+                <a16:creationId xmlns:a16="http://schemas.microsoft.com/office/drawing/2014/main" id="{FA580EC4-647E-4F5E-B54A-CC782DE513D1}"/>
+              </a:ext>
+            </a:extLst>
+          </p:cNvPr>
+          <p:cNvCxnSpPr>
+            <a:cxnSpLocks/>
+            <a:stCxn id="153" idx="3"/>
+            <a:endCxn id="157" idx="7"/>
+          </p:cNvCxnSpPr>
+          <p:nvPr/>
+        </p:nvCxnSpPr>
+        <p:spPr>
+          <a:xfrm flipH="1">
+            <a:off x="9923729" y="1214565"/>
+            <a:ext cx="547268" cy="613282"/>
+          </a:xfrm>
+          <a:prstGeom prst="straightConnector1">
+            <a:avLst/>
+          </a:prstGeom>
+          <a:ln>
+            <a:tailEnd type="triangle"/>
+          </a:ln>
+        </p:spPr>
+        <p:style>
+          <a:lnRef idx="1">
+            <a:schemeClr val="dk1"/>
+          </a:lnRef>
+          <a:fillRef idx="0">
+            <a:schemeClr val="dk1"/>
+          </a:fillRef>
+          <a:effectRef idx="0">
+            <a:schemeClr val="dk1"/>
+          </a:effectRef>
+          <a:fontRef idx="minor">
+            <a:schemeClr val="tx1"/>
+          </a:fontRef>
+        </p:style>
+      </p:cxnSp>
+      <p:sp>
+        <p:nvSpPr>
+          <p:cNvPr id="156" name="Ovale 155">
+            <a:extLst>
+              <a:ext uri="{FF2B5EF4-FFF2-40B4-BE49-F238E27FC236}">
+                <a16:creationId xmlns:a16="http://schemas.microsoft.com/office/drawing/2014/main" id="{9606D1B2-3BCD-4B23-B2B3-4A4A4E3CF4CE}"/>
+              </a:ext>
+            </a:extLst>
+          </p:cNvPr>
+          <p:cNvSpPr/>
+          <p:nvPr/>
+        </p:nvSpPr>
+        <p:spPr>
+          <a:xfrm>
+            <a:off x="8079863" y="441879"/>
+            <a:ext cx="662777" cy="662777"/>
+          </a:xfrm>
+          <a:prstGeom prst="ellipse">
+            <a:avLst/>
+          </a:prstGeom>
+        </p:spPr>
+        <p:style>
+          <a:lnRef idx="2">
+            <a:schemeClr val="dk1">
+              <a:shade val="50000"/>
+            </a:schemeClr>
+          </a:lnRef>
+          <a:fillRef idx="1">
+            <a:schemeClr val="dk1"/>
+          </a:fillRef>
+          <a:effectRef idx="0">
+            <a:schemeClr val="dk1"/>
+          </a:effectRef>
+          <a:fontRef idx="minor">
+            <a:schemeClr val="lt1"/>
+          </a:fontRef>
+        </p:style>
+        <p:txBody>
+          <a:bodyPr rtlCol="0" anchor="ctr"/>
+          <a:lstStyle/>
+          <a:p>
+            <a:pPr algn="ctr"/>
+            <a:r>
+              <a:rPr lang="it-IT" sz="2400" b="1" dirty="0">
+                <a:latin typeface="Arial" panose="020B0604020202020204" pitchFamily="34" charset="0"/>
+                <a:cs typeface="Arial" panose="020B0604020202020204" pitchFamily="34" charset="0"/>
+              </a:rPr>
+              <a:t>4</a:t>
+            </a:r>
+          </a:p>
+          <a:p>
+            <a:pPr algn="ctr"/>
+            <a:r>
+              <a:rPr lang="it-IT" sz="1050" b="1" dirty="0">
+                <a:latin typeface="Arial" panose="020B0604020202020204" pitchFamily="34" charset="0"/>
+                <a:cs typeface="Arial" panose="020B0604020202020204" pitchFamily="34" charset="0"/>
+              </a:rPr>
+              <a:t>IN</a:t>
+            </a:r>
+          </a:p>
+        </p:txBody>
+      </p:sp>
+      <p:sp>
+        <p:nvSpPr>
+          <p:cNvPr id="157" name="Ovale 156">
+            <a:extLst>
+              <a:ext uri="{FF2B5EF4-FFF2-40B4-BE49-F238E27FC236}">
+                <a16:creationId xmlns:a16="http://schemas.microsoft.com/office/drawing/2014/main" id="{E92CCF83-45E8-4AB8-A4CE-FB6E7C03183F}"/>
+              </a:ext>
+            </a:extLst>
+          </p:cNvPr>
+          <p:cNvSpPr/>
+          <p:nvPr/>
+        </p:nvSpPr>
+        <p:spPr>
+          <a:xfrm>
+            <a:off x="9358013" y="1730786"/>
+            <a:ext cx="662777" cy="662777"/>
+          </a:xfrm>
+          <a:prstGeom prst="ellipse">
+            <a:avLst/>
+          </a:prstGeom>
+        </p:spPr>
+        <p:style>
+          <a:lnRef idx="2">
+            <a:schemeClr val="dk1">
+              <a:shade val="50000"/>
+            </a:schemeClr>
+          </a:lnRef>
+          <a:fillRef idx="1">
+            <a:schemeClr val="dk1"/>
+          </a:fillRef>
+          <a:effectRef idx="0">
+            <a:schemeClr val="dk1"/>
+          </a:effectRef>
+          <a:fontRef idx="minor">
+            <a:schemeClr val="lt1"/>
+          </a:fontRef>
+        </p:style>
+        <p:txBody>
+          <a:bodyPr rtlCol="0" anchor="ctr"/>
+          <a:lstStyle/>
+          <a:p>
+            <a:pPr algn="ctr"/>
+            <a:r>
+              <a:rPr lang="it-IT" sz="2400" b="1" dirty="0">
+                <a:latin typeface="Arial" panose="020B0604020202020204" pitchFamily="34" charset="0"/>
+                <a:cs typeface="Arial" panose="020B0604020202020204" pitchFamily="34" charset="0"/>
+              </a:rPr>
+              <a:t>4</a:t>
+            </a:r>
+          </a:p>
+          <a:p>
+            <a:pPr algn="ctr"/>
+            <a:r>
+              <a:rPr lang="it-IT" sz="1050" b="1" dirty="0">
+                <a:latin typeface="Arial" panose="020B0604020202020204" pitchFamily="34" charset="0"/>
+                <a:cs typeface="Arial" panose="020B0604020202020204" pitchFamily="34" charset="0"/>
+              </a:rPr>
+              <a:t>OUT</a:t>
+            </a:r>
+          </a:p>
+        </p:txBody>
+      </p:sp>
+      <p:cxnSp>
+        <p:nvCxnSpPr>
+          <p:cNvPr id="172" name="Connettore 2 171">
+            <a:extLst>
+              <a:ext uri="{FF2B5EF4-FFF2-40B4-BE49-F238E27FC236}">
+                <a16:creationId xmlns:a16="http://schemas.microsoft.com/office/drawing/2014/main" id="{95597E08-4E23-4D38-A5D0-5292545A1C9C}"/>
+              </a:ext>
+            </a:extLst>
+          </p:cNvPr>
+          <p:cNvCxnSpPr>
+            <a:cxnSpLocks/>
+            <a:stCxn id="148" idx="5"/>
+            <a:endCxn id="5" idx="2"/>
+          </p:cNvCxnSpPr>
+          <p:nvPr/>
+        </p:nvCxnSpPr>
+        <p:spPr>
+          <a:xfrm>
+            <a:off x="2942872" y="3744390"/>
+            <a:ext cx="7680866" cy="1101004"/>
+          </a:xfrm>
+          <a:prstGeom prst="straightConnector1">
+            <a:avLst/>
+          </a:prstGeom>
+          <a:ln>
+            <a:tailEnd type="triangle"/>
+          </a:ln>
+        </p:spPr>
+        <p:style>
+          <a:lnRef idx="1">
+            <a:schemeClr val="dk1"/>
+          </a:lnRef>
+          <a:fillRef idx="0">
+            <a:schemeClr val="dk1"/>
+          </a:fillRef>
+          <a:effectRef idx="0">
+            <a:schemeClr val="dk1"/>
+          </a:effectRef>
+          <a:fontRef idx="minor">
+            <a:schemeClr val="tx1"/>
+          </a:fontRef>
+        </p:style>
+      </p:cxnSp>
+      <p:cxnSp>
+        <p:nvCxnSpPr>
+          <p:cNvPr id="179" name="Connettore 2 178">
+            <a:extLst>
+              <a:ext uri="{FF2B5EF4-FFF2-40B4-BE49-F238E27FC236}">
+                <a16:creationId xmlns:a16="http://schemas.microsoft.com/office/drawing/2014/main" id="{EB572890-363D-4F30-BAF1-F93C8DE6A51D}"/>
+              </a:ext>
+            </a:extLst>
+          </p:cNvPr>
+          <p:cNvCxnSpPr>
+            <a:cxnSpLocks/>
+            <a:stCxn id="153" idx="6"/>
+            <a:endCxn id="5" idx="0"/>
+          </p:cNvCxnSpPr>
+          <p:nvPr/>
+        </p:nvCxnSpPr>
+        <p:spPr>
+          <a:xfrm flipH="1">
+            <a:off x="11080938" y="891276"/>
+            <a:ext cx="170548" cy="3496918"/>
+          </a:xfrm>
+          <a:prstGeom prst="straightConnector1">
+            <a:avLst/>
+          </a:prstGeom>
+          <a:ln>
+            <a:tailEnd type="triangle"/>
+          </a:ln>
+        </p:spPr>
+        <p:style>
+          <a:lnRef idx="1">
+            <a:schemeClr val="dk1"/>
+          </a:lnRef>
+          <a:fillRef idx="0">
+            <a:schemeClr val="dk1"/>
+          </a:fillRef>
+          <a:effectRef idx="0">
+            <a:schemeClr val="dk1"/>
+          </a:effectRef>
+          <a:fontRef idx="minor">
+            <a:schemeClr val="tx1"/>
+          </a:fontRef>
+        </p:style>
+      </p:cxnSp>
+      <p:cxnSp>
+        <p:nvCxnSpPr>
+          <p:cNvPr id="207" name="Connettore 2 206">
+            <a:extLst>
+              <a:ext uri="{FF2B5EF4-FFF2-40B4-BE49-F238E27FC236}">
+                <a16:creationId xmlns:a16="http://schemas.microsoft.com/office/drawing/2014/main" id="{419A12B0-263B-4D45-9A71-28CCBDA7BC02}"/>
+              </a:ext>
+            </a:extLst>
+          </p:cNvPr>
+          <p:cNvCxnSpPr>
+            <a:cxnSpLocks/>
+            <a:stCxn id="133" idx="3"/>
+            <a:endCxn id="151" idx="7"/>
+          </p:cNvCxnSpPr>
+          <p:nvPr/>
+        </p:nvCxnSpPr>
+        <p:spPr>
+          <a:xfrm flipH="1">
+            <a:off x="4928022" y="2142692"/>
+            <a:ext cx="368284" cy="579000"/>
+          </a:xfrm>
+          <a:prstGeom prst="straightConnector1">
+            <a:avLst/>
+          </a:prstGeom>
+          <a:ln>
+            <a:tailEnd type="triangle"/>
+          </a:ln>
+        </p:spPr>
+        <p:style>
+          <a:lnRef idx="1">
+            <a:schemeClr val="dk1"/>
+          </a:lnRef>
+          <a:fillRef idx="0">
+            <a:schemeClr val="dk1"/>
+          </a:fillRef>
+          <a:effectRef idx="0">
+            <a:schemeClr val="dk1"/>
+          </a:effectRef>
+          <a:fontRef idx="minor">
+            <a:schemeClr val="tx1"/>
+          </a:fontRef>
+        </p:style>
+      </p:cxnSp>
+      <p:cxnSp>
+        <p:nvCxnSpPr>
+          <p:cNvPr id="219" name="Connettore 2 218">
+            <a:extLst>
+              <a:ext uri="{FF2B5EF4-FFF2-40B4-BE49-F238E27FC236}">
+                <a16:creationId xmlns:a16="http://schemas.microsoft.com/office/drawing/2014/main" id="{71DE0D7B-3C16-4866-A5E7-9B2997A34279}"/>
+              </a:ext>
+            </a:extLst>
+          </p:cNvPr>
+          <p:cNvCxnSpPr>
+            <a:cxnSpLocks/>
+            <a:stCxn id="152" idx="0"/>
+            <a:endCxn id="131" idx="5"/>
+          </p:cNvCxnSpPr>
+          <p:nvPr/>
+        </p:nvCxnSpPr>
+        <p:spPr>
+          <a:xfrm flipH="1" flipV="1">
+            <a:off x="2830497" y="1171081"/>
+            <a:ext cx="434516" cy="787198"/>
+          </a:xfrm>
+          <a:prstGeom prst="straightConnector1">
+            <a:avLst/>
+          </a:prstGeom>
+          <a:ln>
+            <a:tailEnd type="triangle"/>
+          </a:ln>
+        </p:spPr>
+        <p:style>
+          <a:lnRef idx="1">
+            <a:schemeClr val="dk1"/>
+          </a:lnRef>
+          <a:fillRef idx="0">
+            <a:schemeClr val="dk1"/>
+          </a:fillRef>
+          <a:effectRef idx="0">
+            <a:schemeClr val="dk1"/>
+          </a:effectRef>
+          <a:fontRef idx="minor">
+            <a:schemeClr val="tx1"/>
+          </a:fontRef>
+        </p:style>
+      </p:cxnSp>
+      <p:cxnSp>
+        <p:nvCxnSpPr>
+          <p:cNvPr id="225" name="Connettore 2 224">
+            <a:extLst>
+              <a:ext uri="{FF2B5EF4-FFF2-40B4-BE49-F238E27FC236}">
+                <a16:creationId xmlns:a16="http://schemas.microsoft.com/office/drawing/2014/main" id="{FB8652B8-FBC2-49A8-9EA4-C0A3AB0818F9}"/>
+              </a:ext>
+            </a:extLst>
+          </p:cNvPr>
+          <p:cNvCxnSpPr>
+            <a:cxnSpLocks/>
+            <a:stCxn id="127" idx="0"/>
+            <a:endCxn id="156" idx="4"/>
+          </p:cNvCxnSpPr>
+          <p:nvPr/>
+        </p:nvCxnSpPr>
+        <p:spPr>
+          <a:xfrm flipV="1">
+            <a:off x="5975782" y="1104656"/>
+            <a:ext cx="2435470" cy="3409349"/>
+          </a:xfrm>
+          <a:prstGeom prst="straightConnector1">
+            <a:avLst/>
+          </a:prstGeom>
+          <a:ln>
+            <a:tailEnd type="triangle"/>
+          </a:ln>
+        </p:spPr>
+        <p:style>
+          <a:lnRef idx="1">
+            <a:schemeClr val="dk1"/>
+          </a:lnRef>
+          <a:fillRef idx="0">
+            <a:schemeClr val="dk1"/>
+          </a:fillRef>
+          <a:effectRef idx="0">
+            <a:schemeClr val="dk1"/>
+          </a:effectRef>
+          <a:fontRef idx="minor">
+            <a:schemeClr val="tx1"/>
+          </a:fontRef>
+        </p:style>
+      </p:cxnSp>
+      <p:cxnSp>
+        <p:nvCxnSpPr>
+          <p:cNvPr id="228" name="Connettore 2 227">
+            <a:extLst>
+              <a:ext uri="{FF2B5EF4-FFF2-40B4-BE49-F238E27FC236}">
+                <a16:creationId xmlns:a16="http://schemas.microsoft.com/office/drawing/2014/main" id="{78F0C29B-FFE8-40CC-90BF-5A53723D2B61}"/>
+              </a:ext>
+            </a:extLst>
+          </p:cNvPr>
+          <p:cNvCxnSpPr>
+            <a:cxnSpLocks/>
+            <a:endCxn id="7" idx="7"/>
+          </p:cNvCxnSpPr>
+          <p:nvPr/>
+        </p:nvCxnSpPr>
+        <p:spPr>
+          <a:xfrm flipH="1">
+            <a:off x="3762940" y="2095875"/>
+            <a:ext cx="5595072" cy="3342310"/>
+          </a:xfrm>
+          <a:prstGeom prst="straightConnector1">
+            <a:avLst/>
+          </a:prstGeom>
+          <a:ln>
+            <a:tailEnd type="triangle"/>
+          </a:ln>
+        </p:spPr>
+        <p:style>
+          <a:lnRef idx="1">
+            <a:schemeClr val="dk1"/>
+          </a:lnRef>
+          <a:fillRef idx="0">
+            <a:schemeClr val="dk1"/>
+          </a:fillRef>
+          <a:effectRef idx="0">
+            <a:schemeClr val="dk1"/>
+          </a:effectRef>
+          <a:fontRef idx="minor">
+            <a:schemeClr val="tx1"/>
+          </a:fontRef>
+        </p:style>
+      </p:cxnSp>
+      <p:cxnSp>
+        <p:nvCxnSpPr>
+          <p:cNvPr id="231" name="Connettore 2 230">
+            <a:extLst>
+              <a:ext uri="{FF2B5EF4-FFF2-40B4-BE49-F238E27FC236}">
+                <a16:creationId xmlns:a16="http://schemas.microsoft.com/office/drawing/2014/main" id="{28B791F1-3570-4B85-9ADA-21AA43E90996}"/>
+              </a:ext>
+            </a:extLst>
+          </p:cNvPr>
+          <p:cNvCxnSpPr>
+            <a:cxnSpLocks/>
+            <a:stCxn id="152" idx="4"/>
+            <a:endCxn id="7" idx="0"/>
+          </p:cNvCxnSpPr>
+          <p:nvPr/>
+        </p:nvCxnSpPr>
+        <p:spPr>
+          <a:xfrm>
+            <a:off x="3265013" y="2621056"/>
+            <a:ext cx="263600" cy="2720068"/>
+          </a:xfrm>
+          <a:prstGeom prst="straightConnector1">
+            <a:avLst/>
+          </a:prstGeom>
+          <a:ln>
+            <a:tailEnd type="triangle"/>
+          </a:ln>
+        </p:spPr>
+        <p:style>
+          <a:lnRef idx="1">
+            <a:schemeClr val="dk1"/>
+          </a:lnRef>
+          <a:fillRef idx="0">
+            <a:schemeClr val="dk1"/>
+          </a:fillRef>
+          <a:effectRef idx="0">
+            <a:schemeClr val="dk1"/>
+          </a:effectRef>
+          <a:fontRef idx="minor">
+            <a:schemeClr val="tx1"/>
+          </a:fontRef>
+        </p:style>
+      </p:cxnSp>
+      <p:cxnSp>
+        <p:nvCxnSpPr>
+          <p:cNvPr id="235" name="Connettore 2 234">
+            <a:extLst>
+              <a:ext uri="{FF2B5EF4-FFF2-40B4-BE49-F238E27FC236}">
+                <a16:creationId xmlns:a16="http://schemas.microsoft.com/office/drawing/2014/main" id="{17031CFD-4C89-427B-ACBC-1A78A27D3570}"/>
+              </a:ext>
+            </a:extLst>
+          </p:cNvPr>
+          <p:cNvCxnSpPr>
+            <a:cxnSpLocks/>
+            <a:stCxn id="127" idx="1"/>
+            <a:endCxn id="151" idx="5"/>
+          </p:cNvCxnSpPr>
+          <p:nvPr/>
+        </p:nvCxnSpPr>
+        <p:spPr>
+          <a:xfrm flipH="1" flipV="1">
+            <a:off x="4928022" y="3190347"/>
+            <a:ext cx="813432" cy="1420719"/>
+          </a:xfrm>
+          <a:prstGeom prst="straightConnector1">
+            <a:avLst/>
+          </a:prstGeom>
+          <a:ln>
+            <a:tailEnd type="triangle"/>
+          </a:ln>
+        </p:spPr>
+        <p:style>
+          <a:lnRef idx="1">
+            <a:schemeClr val="dk1"/>
+          </a:lnRef>
+          <a:fillRef idx="0">
+            <a:schemeClr val="dk1"/>
+          </a:fillRef>
+          <a:effectRef idx="0">
+            <a:schemeClr val="dk1"/>
+          </a:effectRef>
+          <a:fontRef idx="minor">
+            <a:schemeClr val="tx1"/>
+          </a:fontRef>
+        </p:style>
+      </p:cxnSp>
+      <p:sp>
+        <p:nvSpPr>
+          <p:cNvPr id="239" name="Rettangolo 238">
+            <a:extLst>
+              <a:ext uri="{FF2B5EF4-FFF2-40B4-BE49-F238E27FC236}">
+                <a16:creationId xmlns:a16="http://schemas.microsoft.com/office/drawing/2014/main" id="{ECBB15D2-A502-4407-949F-91C3A0939742}"/>
+              </a:ext>
+            </a:extLst>
+          </p:cNvPr>
+          <p:cNvSpPr/>
+          <p:nvPr/>
+        </p:nvSpPr>
+        <p:spPr>
+          <a:xfrm>
+            <a:off x="3563061" y="393357"/>
+            <a:ext cx="1090790" cy="400110"/>
+          </a:xfrm>
+          <a:prstGeom prst="rect">
+            <a:avLst/>
+          </a:prstGeom>
+          <a:noFill/>
+        </p:spPr>
+        <p:txBody>
+          <a:bodyPr wrap="square" lIns="91440" tIns="45720" rIns="91440" bIns="45720">
+            <a:spAutoFit/>
+          </a:bodyPr>
+          <a:lstStyle/>
+          <a:p>
+            <a:pPr algn="ctr"/>
+            <a:r>
+              <a:rPr lang="it-IT" sz="2000" b="0" cap="none" spc="0" dirty="0">
+                <a:ln w="0"/>
+                <a:solidFill>
+                  <a:schemeClr val="tx1"/>
+                </a:solidFill>
+                <a:effectLst>
+                  <a:outerShdw blurRad="38100" dist="19050" dir="2700000" algn="tl" rotWithShape="0">
+                    <a:schemeClr val="dk1">
+                      <a:alpha val="40000"/>
+                    </a:schemeClr>
+                  </a:outerShdw>
+                </a:effectLst>
+              </a:rPr>
+              <a:t>0/</a:t>
+            </a:r>
+            <a:r>
+              <a:rPr lang="it-IT" sz="2000" dirty="0">
+                <a:ln w="0"/>
+                <a:effectLst>
+                  <a:outerShdw blurRad="38100" dist="19050" dir="2700000" algn="tl" rotWithShape="0">
+                    <a:schemeClr val="dk1">
+                      <a:alpha val="40000"/>
+                    </a:schemeClr>
+                  </a:outerShdw>
+                </a:effectLst>
+                <a:latin typeface="Arial" panose="020B0604020202020204" pitchFamily="34" charset="0"/>
+                <a:cs typeface="Arial" panose="020B0604020202020204" pitchFamily="34" charset="0"/>
+              </a:rPr>
+              <a:t>N</a:t>
+            </a:r>
+            <a:r>
+              <a:rPr lang="it-IT" sz="2000" baseline="-25000" dirty="0">
+                <a:latin typeface="Arial" panose="020B0604020202020204" pitchFamily="34" charset="0"/>
+                <a:cs typeface="Arial" panose="020B0604020202020204" pitchFamily="34" charset="0"/>
+              </a:rPr>
+              <a:t>f</a:t>
+            </a:r>
+            <a:r>
+              <a:rPr lang="it-IT" sz="1100" baseline="-60000" dirty="0">
+                <a:latin typeface="Arial" panose="020B0604020202020204" pitchFamily="34" charset="0"/>
+                <a:cs typeface="Arial" panose="020B0604020202020204" pitchFamily="34" charset="0"/>
+              </a:rPr>
+              <a:t>2</a:t>
+            </a:r>
+            <a:endParaRPr lang="it-IT" sz="2000" b="0" cap="none" spc="0" dirty="0">
+              <a:ln w="0"/>
+              <a:solidFill>
+                <a:schemeClr val="tx1"/>
+              </a:solidFill>
+              <a:effectLst>
+                <a:outerShdw blurRad="38100" dist="19050" dir="2700000" algn="tl" rotWithShape="0">
+                  <a:schemeClr val="dk1">
+                    <a:alpha val="40000"/>
+                  </a:schemeClr>
+                </a:outerShdw>
+              </a:effectLst>
+            </a:endParaRPr>
+          </a:p>
+        </p:txBody>
+      </p:sp>
+      <p:sp>
+        <p:nvSpPr>
+          <p:cNvPr id="240" name="Rettangolo 239">
+            <a:extLst>
+              <a:ext uri="{FF2B5EF4-FFF2-40B4-BE49-F238E27FC236}">
+                <a16:creationId xmlns:a16="http://schemas.microsoft.com/office/drawing/2014/main" id="{EF46D5C0-0A0A-49FE-B2D7-DF213E49A718}"/>
+              </a:ext>
+            </a:extLst>
+          </p:cNvPr>
+          <p:cNvSpPr/>
+          <p:nvPr/>
+        </p:nvSpPr>
+        <p:spPr>
+          <a:xfrm>
+            <a:off x="8947820" y="378766"/>
+            <a:ext cx="1090790" cy="400110"/>
+          </a:xfrm>
+          <a:prstGeom prst="rect">
+            <a:avLst/>
+          </a:prstGeom>
+          <a:noFill/>
+        </p:spPr>
+        <p:txBody>
+          <a:bodyPr wrap="square" lIns="91440" tIns="45720" rIns="91440" bIns="45720">
+            <a:spAutoFit/>
+          </a:bodyPr>
+          <a:lstStyle/>
+          <a:p>
+            <a:pPr algn="ctr"/>
+            <a:r>
+              <a:rPr lang="it-IT" sz="2000" b="0" cap="none" spc="0" dirty="0">
+                <a:ln w="0"/>
+                <a:solidFill>
+                  <a:schemeClr val="tx1"/>
+                </a:solidFill>
+                <a:effectLst>
+                  <a:outerShdw blurRad="38100" dist="19050" dir="2700000" algn="tl" rotWithShape="0">
+                    <a:schemeClr val="dk1">
+                      <a:alpha val="40000"/>
+                    </a:schemeClr>
+                  </a:outerShdw>
+                </a:effectLst>
+              </a:rPr>
+              <a:t>0/</a:t>
+            </a:r>
+            <a:r>
+              <a:rPr lang="it-IT" sz="2000" dirty="0">
+                <a:ln w="0"/>
+                <a:effectLst>
+                  <a:outerShdw blurRad="38100" dist="19050" dir="2700000" algn="tl" rotWithShape="0">
+                    <a:schemeClr val="dk1">
+                      <a:alpha val="40000"/>
+                    </a:schemeClr>
+                  </a:outerShdw>
+                </a:effectLst>
+                <a:latin typeface="Arial" panose="020B0604020202020204" pitchFamily="34" charset="0"/>
+                <a:cs typeface="Arial" panose="020B0604020202020204" pitchFamily="34" charset="0"/>
+              </a:rPr>
+              <a:t>N</a:t>
+            </a:r>
+            <a:r>
+              <a:rPr lang="it-IT" sz="2000" baseline="-25000" dirty="0">
+                <a:latin typeface="Arial" panose="020B0604020202020204" pitchFamily="34" charset="0"/>
+                <a:cs typeface="Arial" panose="020B0604020202020204" pitchFamily="34" charset="0"/>
+              </a:rPr>
+              <a:t>f</a:t>
+            </a:r>
+            <a:r>
+              <a:rPr lang="it-IT" sz="1100" baseline="-60000" dirty="0">
+                <a:latin typeface="Arial" panose="020B0604020202020204" pitchFamily="34" charset="0"/>
+                <a:cs typeface="Arial" panose="020B0604020202020204" pitchFamily="34" charset="0"/>
+              </a:rPr>
+              <a:t>4</a:t>
+            </a:r>
+            <a:endParaRPr lang="it-IT" sz="2000" b="0" cap="none" spc="0" dirty="0">
+              <a:ln w="0"/>
+              <a:solidFill>
+                <a:schemeClr val="tx1"/>
+              </a:solidFill>
+              <a:effectLst>
+                <a:outerShdw blurRad="38100" dist="19050" dir="2700000" algn="tl" rotWithShape="0">
+                  <a:schemeClr val="dk1">
+                    <a:alpha val="40000"/>
+                  </a:schemeClr>
+                </a:outerShdw>
+              </a:effectLst>
+            </a:endParaRPr>
+          </a:p>
+        </p:txBody>
+      </p:sp>
+      <p:sp>
+        <p:nvSpPr>
+          <p:cNvPr id="241" name="Rettangolo 240">
+            <a:extLst>
+              <a:ext uri="{FF2B5EF4-FFF2-40B4-BE49-F238E27FC236}">
+                <a16:creationId xmlns:a16="http://schemas.microsoft.com/office/drawing/2014/main" id="{4346A84F-3B4F-4B6E-A2EA-BC5DB409E2BF}"/>
+              </a:ext>
+            </a:extLst>
+          </p:cNvPr>
+          <p:cNvSpPr/>
+          <p:nvPr/>
+        </p:nvSpPr>
+        <p:spPr>
+          <a:xfrm>
+            <a:off x="4436712" y="5752204"/>
+            <a:ext cx="1090790" cy="400110"/>
+          </a:xfrm>
+          <a:prstGeom prst="rect">
+            <a:avLst/>
+          </a:prstGeom>
+          <a:noFill/>
+        </p:spPr>
+        <p:txBody>
+          <a:bodyPr wrap="square" lIns="91440" tIns="45720" rIns="91440" bIns="45720">
+            <a:spAutoFit/>
+          </a:bodyPr>
+          <a:lstStyle/>
+          <a:p>
+            <a:pPr algn="ctr"/>
+            <a:r>
+              <a:rPr lang="it-IT" sz="2000" b="0" cap="none" spc="0" dirty="0">
+                <a:ln w="0"/>
+                <a:solidFill>
+                  <a:schemeClr val="tx1"/>
+                </a:solidFill>
+                <a:effectLst>
+                  <a:outerShdw blurRad="38100" dist="19050" dir="2700000" algn="tl" rotWithShape="0">
+                    <a:schemeClr val="dk1">
+                      <a:alpha val="40000"/>
+                    </a:schemeClr>
+                  </a:outerShdw>
+                </a:effectLst>
+              </a:rPr>
+              <a:t>0/</a:t>
+            </a:r>
+            <a:r>
+              <a:rPr lang="it-IT" sz="2000" dirty="0">
+                <a:ln w="0"/>
+                <a:effectLst>
+                  <a:outerShdw blurRad="38100" dist="19050" dir="2700000" algn="tl" rotWithShape="0">
+                    <a:schemeClr val="dk1">
+                      <a:alpha val="40000"/>
+                    </a:schemeClr>
+                  </a:outerShdw>
+                </a:effectLst>
+                <a:latin typeface="Arial" panose="020B0604020202020204" pitchFamily="34" charset="0"/>
+                <a:cs typeface="Arial" panose="020B0604020202020204" pitchFamily="34" charset="0"/>
+              </a:rPr>
+              <a:t>N</a:t>
+            </a:r>
+            <a:r>
+              <a:rPr lang="it-IT" sz="2000" baseline="-25000" dirty="0">
+                <a:latin typeface="Arial" panose="020B0604020202020204" pitchFamily="34" charset="0"/>
+                <a:cs typeface="Arial" panose="020B0604020202020204" pitchFamily="34" charset="0"/>
+              </a:rPr>
+              <a:t>f</a:t>
+            </a:r>
+            <a:r>
+              <a:rPr lang="it-IT" sz="1100" baseline="-60000" dirty="0">
+                <a:latin typeface="Arial" panose="020B0604020202020204" pitchFamily="34" charset="0"/>
+                <a:cs typeface="Arial" panose="020B0604020202020204" pitchFamily="34" charset="0"/>
+              </a:rPr>
+              <a:t>1</a:t>
+            </a:r>
+            <a:endParaRPr lang="it-IT" sz="2000" b="0" cap="none" spc="0" dirty="0">
+              <a:ln w="0"/>
+              <a:solidFill>
+                <a:schemeClr val="tx1"/>
+              </a:solidFill>
+              <a:effectLst>
+                <a:outerShdw blurRad="38100" dist="19050" dir="2700000" algn="tl" rotWithShape="0">
+                  <a:schemeClr val="dk1">
+                    <a:alpha val="40000"/>
+                  </a:schemeClr>
+                </a:outerShdw>
+              </a:effectLst>
+            </a:endParaRPr>
+          </a:p>
+        </p:txBody>
+      </p:sp>
+      <p:sp>
+        <p:nvSpPr>
+          <p:cNvPr id="242" name="Rettangolo 241">
+            <a:extLst>
+              <a:ext uri="{FF2B5EF4-FFF2-40B4-BE49-F238E27FC236}">
+                <a16:creationId xmlns:a16="http://schemas.microsoft.com/office/drawing/2014/main" id="{0C484268-7DE3-4C4F-98EE-8734D2FAE6D8}"/>
+              </a:ext>
+            </a:extLst>
+          </p:cNvPr>
+          <p:cNvSpPr/>
+          <p:nvPr/>
+        </p:nvSpPr>
+        <p:spPr>
+          <a:xfrm>
+            <a:off x="3351572" y="2609269"/>
+            <a:ext cx="1090790" cy="400110"/>
+          </a:xfrm>
+          <a:prstGeom prst="rect">
+            <a:avLst/>
+          </a:prstGeom>
+          <a:noFill/>
+        </p:spPr>
+        <p:txBody>
+          <a:bodyPr wrap="square" lIns="91440" tIns="45720" rIns="91440" bIns="45720">
+            <a:spAutoFit/>
+          </a:bodyPr>
+          <a:lstStyle/>
+          <a:p>
+            <a:pPr algn="ctr"/>
+            <a:r>
+              <a:rPr lang="it-IT" sz="2000" b="0" cap="none" spc="0" dirty="0">
+                <a:ln w="0"/>
+                <a:solidFill>
+                  <a:schemeClr val="tx1"/>
+                </a:solidFill>
+                <a:effectLst>
+                  <a:outerShdw blurRad="38100" dist="19050" dir="2700000" algn="tl" rotWithShape="0">
+                    <a:schemeClr val="dk1">
+                      <a:alpha val="40000"/>
+                    </a:schemeClr>
+                  </a:outerShdw>
+                </a:effectLst>
+              </a:rPr>
+              <a:t>0/</a:t>
+            </a:r>
+            <a:r>
+              <a:rPr lang="it-IT" sz="2000" dirty="0">
+                <a:ln w="0"/>
+                <a:effectLst>
+                  <a:outerShdw blurRad="38100" dist="19050" dir="2700000" algn="tl" rotWithShape="0">
+                    <a:schemeClr val="dk1">
+                      <a:alpha val="40000"/>
+                    </a:schemeClr>
+                  </a:outerShdw>
+                </a:effectLst>
+                <a:latin typeface="Arial" panose="020B0604020202020204" pitchFamily="34" charset="0"/>
+                <a:cs typeface="Arial" panose="020B0604020202020204" pitchFamily="34" charset="0"/>
+              </a:rPr>
+              <a:t>N</a:t>
+            </a:r>
+            <a:r>
+              <a:rPr lang="it-IT" sz="2000" baseline="-25000" dirty="0">
+                <a:latin typeface="Arial" panose="020B0604020202020204" pitchFamily="34" charset="0"/>
+                <a:cs typeface="Arial" panose="020B0604020202020204" pitchFamily="34" charset="0"/>
+              </a:rPr>
+              <a:t>f</a:t>
+            </a:r>
+            <a:r>
+              <a:rPr lang="it-IT" sz="1100" baseline="-60000" dirty="0">
+                <a:latin typeface="Arial" panose="020B0604020202020204" pitchFamily="34" charset="0"/>
+                <a:cs typeface="Arial" panose="020B0604020202020204" pitchFamily="34" charset="0"/>
+              </a:rPr>
+              <a:t>3</a:t>
+            </a:r>
+            <a:endParaRPr lang="it-IT" sz="2000" b="0" cap="none" spc="0" dirty="0">
+              <a:ln w="0"/>
+              <a:solidFill>
+                <a:schemeClr val="tx1"/>
+              </a:solidFill>
+              <a:effectLst>
+                <a:outerShdw blurRad="38100" dist="19050" dir="2700000" algn="tl" rotWithShape="0">
+                  <a:schemeClr val="dk1">
+                    <a:alpha val="40000"/>
+                  </a:schemeClr>
+                </a:outerShdw>
+              </a:effectLst>
+            </a:endParaRPr>
+          </a:p>
+        </p:txBody>
+      </p:sp>
+      <p:sp>
+        <p:nvSpPr>
+          <p:cNvPr id="243" name="Rettangolo 242">
+            <a:extLst>
+              <a:ext uri="{FF2B5EF4-FFF2-40B4-BE49-F238E27FC236}">
+                <a16:creationId xmlns:a16="http://schemas.microsoft.com/office/drawing/2014/main" id="{AF103CEF-E0EB-40B9-A6DE-25572E2245B2}"/>
+              </a:ext>
+            </a:extLst>
+          </p:cNvPr>
+          <p:cNvSpPr/>
+          <p:nvPr/>
+        </p:nvSpPr>
+        <p:spPr>
+          <a:xfrm>
+            <a:off x="8861200" y="5485995"/>
+            <a:ext cx="1090790" cy="400110"/>
+          </a:xfrm>
+          <a:prstGeom prst="rect">
+            <a:avLst/>
+          </a:prstGeom>
+          <a:noFill/>
+        </p:spPr>
+        <p:txBody>
+          <a:bodyPr wrap="square" lIns="91440" tIns="45720" rIns="91440" bIns="45720">
+            <a:spAutoFit/>
+          </a:bodyPr>
+          <a:lstStyle/>
+          <a:p>
+            <a:pPr algn="ctr"/>
+            <a:r>
+              <a:rPr lang="it-IT" sz="2000" b="0" cap="none" spc="0" dirty="0">
+                <a:ln w="0"/>
+                <a:solidFill>
+                  <a:schemeClr val="tx1"/>
+                </a:solidFill>
+                <a:effectLst>
+                  <a:outerShdw blurRad="38100" dist="19050" dir="2700000" algn="tl" rotWithShape="0">
+                    <a:schemeClr val="dk1">
+                      <a:alpha val="40000"/>
+                    </a:schemeClr>
+                  </a:outerShdw>
+                </a:effectLst>
+              </a:rPr>
+              <a:t>0/</a:t>
+            </a:r>
+            <a:r>
+              <a:rPr lang="it-IT" sz="2000" dirty="0">
+                <a:ln w="0"/>
+                <a:effectLst>
+                  <a:outerShdw blurRad="38100" dist="19050" dir="2700000" algn="tl" rotWithShape="0">
+                    <a:schemeClr val="dk1">
+                      <a:alpha val="40000"/>
+                    </a:schemeClr>
+                  </a:outerShdw>
+                </a:effectLst>
+                <a:latin typeface="Arial" panose="020B0604020202020204" pitchFamily="34" charset="0"/>
+                <a:cs typeface="Arial" panose="020B0604020202020204" pitchFamily="34" charset="0"/>
+              </a:rPr>
+              <a:t>S</a:t>
+            </a:r>
+            <a:r>
+              <a:rPr lang="it-IT" sz="2000" baseline="-25000" dirty="0">
+                <a:latin typeface="Arial" panose="020B0604020202020204" pitchFamily="34" charset="0"/>
+                <a:cs typeface="Arial" panose="020B0604020202020204" pitchFamily="34" charset="0"/>
+              </a:rPr>
+              <a:t>f</a:t>
+            </a:r>
+            <a:r>
+              <a:rPr lang="it-IT" sz="1100" baseline="-60000" dirty="0">
+                <a:latin typeface="Arial" panose="020B0604020202020204" pitchFamily="34" charset="0"/>
+                <a:cs typeface="Arial" panose="020B0604020202020204" pitchFamily="34" charset="0"/>
+              </a:rPr>
+              <a:t>1</a:t>
+            </a:r>
+            <a:endParaRPr lang="it-IT" sz="2000" b="0" cap="none" spc="0" dirty="0">
+              <a:ln w="0"/>
+              <a:solidFill>
+                <a:schemeClr val="tx1"/>
+              </a:solidFill>
+              <a:effectLst>
+                <a:outerShdw blurRad="38100" dist="19050" dir="2700000" algn="tl" rotWithShape="0">
+                  <a:schemeClr val="dk1">
+                    <a:alpha val="40000"/>
+                  </a:schemeClr>
+                </a:outerShdw>
+              </a:effectLst>
+            </a:endParaRPr>
+          </a:p>
+        </p:txBody>
+      </p:sp>
+      <p:sp>
+        <p:nvSpPr>
+          <p:cNvPr id="248" name="Rettangolo 247">
+            <a:extLst>
+              <a:ext uri="{FF2B5EF4-FFF2-40B4-BE49-F238E27FC236}">
+                <a16:creationId xmlns:a16="http://schemas.microsoft.com/office/drawing/2014/main" id="{F5D881B9-F6E7-4C72-B9A2-C10EA7681E4B}"/>
+              </a:ext>
+            </a:extLst>
+          </p:cNvPr>
+          <p:cNvSpPr/>
+          <p:nvPr/>
+        </p:nvSpPr>
+        <p:spPr>
+          <a:xfrm>
+            <a:off x="8297008" y="4117945"/>
+            <a:ext cx="1090790" cy="400110"/>
+          </a:xfrm>
+          <a:prstGeom prst="rect">
+            <a:avLst/>
+          </a:prstGeom>
+          <a:noFill/>
+        </p:spPr>
+        <p:txBody>
+          <a:bodyPr wrap="square" lIns="91440" tIns="45720" rIns="91440" bIns="45720">
+            <a:spAutoFit/>
+          </a:bodyPr>
+          <a:lstStyle/>
+          <a:p>
+            <a:pPr algn="ctr"/>
+            <a:r>
+              <a:rPr lang="it-IT" sz="2000" b="0" cap="none" spc="0" dirty="0">
+                <a:ln w="0"/>
+                <a:solidFill>
+                  <a:schemeClr val="tx1"/>
+                </a:solidFill>
+                <a:effectLst>
+                  <a:outerShdw blurRad="38100" dist="19050" dir="2700000" algn="tl" rotWithShape="0">
+                    <a:schemeClr val="dk1">
+                      <a:alpha val="40000"/>
+                    </a:schemeClr>
+                  </a:outerShdw>
+                </a:effectLst>
+              </a:rPr>
+              <a:t>0/</a:t>
+            </a:r>
+            <a:r>
+              <a:rPr lang="it-IT" sz="2000" dirty="0">
+                <a:ln w="0"/>
+                <a:effectLst>
+                  <a:outerShdw blurRad="38100" dist="19050" dir="2700000" algn="tl" rotWithShape="0">
+                    <a:schemeClr val="dk1">
+                      <a:alpha val="40000"/>
+                    </a:schemeClr>
+                  </a:outerShdw>
+                </a:effectLst>
+                <a:latin typeface="Arial" panose="020B0604020202020204" pitchFamily="34" charset="0"/>
+                <a:cs typeface="Arial" panose="020B0604020202020204" pitchFamily="34" charset="0"/>
+              </a:rPr>
+              <a:t>S</a:t>
+            </a:r>
+            <a:r>
+              <a:rPr lang="it-IT" sz="2000" baseline="-25000" dirty="0">
+                <a:latin typeface="Arial" panose="020B0604020202020204" pitchFamily="34" charset="0"/>
+                <a:cs typeface="Arial" panose="020B0604020202020204" pitchFamily="34" charset="0"/>
+              </a:rPr>
+              <a:t>f</a:t>
+            </a:r>
+            <a:r>
+              <a:rPr lang="it-IT" sz="1100" baseline="-60000" dirty="0">
+                <a:latin typeface="Arial" panose="020B0604020202020204" pitchFamily="34" charset="0"/>
+                <a:cs typeface="Arial" panose="020B0604020202020204" pitchFamily="34" charset="0"/>
+              </a:rPr>
+              <a:t>3</a:t>
+            </a:r>
+            <a:endParaRPr lang="it-IT" sz="2000" b="0" cap="none" spc="0" dirty="0">
+              <a:ln w="0"/>
+              <a:solidFill>
+                <a:schemeClr val="tx1"/>
+              </a:solidFill>
+              <a:effectLst>
+                <a:outerShdw blurRad="38100" dist="19050" dir="2700000" algn="tl" rotWithShape="0">
+                  <a:schemeClr val="dk1">
+                    <a:alpha val="40000"/>
+                  </a:schemeClr>
+                </a:outerShdw>
+              </a:effectLst>
+            </a:endParaRPr>
+          </a:p>
+        </p:txBody>
+      </p:sp>
+      <p:sp>
+        <p:nvSpPr>
+          <p:cNvPr id="249" name="Rettangolo 248">
+            <a:extLst>
+              <a:ext uri="{FF2B5EF4-FFF2-40B4-BE49-F238E27FC236}">
+                <a16:creationId xmlns:a16="http://schemas.microsoft.com/office/drawing/2014/main" id="{8B641F43-97F4-4E5B-9C0C-B776C99232A8}"/>
+              </a:ext>
+            </a:extLst>
+          </p:cNvPr>
+          <p:cNvSpPr/>
+          <p:nvPr/>
+        </p:nvSpPr>
+        <p:spPr>
+          <a:xfrm>
+            <a:off x="9743791" y="3504538"/>
+            <a:ext cx="1090790" cy="400110"/>
+          </a:xfrm>
+          <a:prstGeom prst="rect">
+            <a:avLst/>
+          </a:prstGeom>
+          <a:noFill/>
+        </p:spPr>
+        <p:txBody>
+          <a:bodyPr wrap="square" lIns="91440" tIns="45720" rIns="91440" bIns="45720">
+            <a:spAutoFit/>
+          </a:bodyPr>
+          <a:lstStyle/>
+          <a:p>
+            <a:pPr algn="ctr"/>
+            <a:r>
+              <a:rPr lang="it-IT" sz="2000" b="0" cap="none" spc="0" dirty="0">
+                <a:ln w="0"/>
+                <a:solidFill>
+                  <a:schemeClr val="tx1"/>
+                </a:solidFill>
+                <a:effectLst>
+                  <a:outerShdw blurRad="38100" dist="19050" dir="2700000" algn="tl" rotWithShape="0">
+                    <a:schemeClr val="dk1">
+                      <a:alpha val="40000"/>
+                    </a:schemeClr>
+                  </a:outerShdw>
+                </a:effectLst>
+              </a:rPr>
+              <a:t>0/</a:t>
+            </a:r>
+            <a:r>
+              <a:rPr lang="it-IT" sz="2000" dirty="0">
+                <a:ln w="0"/>
+                <a:effectLst>
+                  <a:outerShdw blurRad="38100" dist="19050" dir="2700000" algn="tl" rotWithShape="0">
+                    <a:schemeClr val="dk1">
+                      <a:alpha val="40000"/>
+                    </a:schemeClr>
+                  </a:outerShdw>
+                </a:effectLst>
+                <a:latin typeface="Arial" panose="020B0604020202020204" pitchFamily="34" charset="0"/>
+                <a:cs typeface="Arial" panose="020B0604020202020204" pitchFamily="34" charset="0"/>
+              </a:rPr>
+              <a:t>S</a:t>
+            </a:r>
+            <a:r>
+              <a:rPr lang="it-IT" sz="2000" baseline="-25000" dirty="0">
+                <a:latin typeface="Arial" panose="020B0604020202020204" pitchFamily="34" charset="0"/>
+                <a:cs typeface="Arial" panose="020B0604020202020204" pitchFamily="34" charset="0"/>
+              </a:rPr>
+              <a:t>f</a:t>
+            </a:r>
+            <a:r>
+              <a:rPr lang="it-IT" sz="1100" baseline="-60000" dirty="0">
+                <a:latin typeface="Arial" panose="020B0604020202020204" pitchFamily="34" charset="0"/>
+                <a:cs typeface="Arial" panose="020B0604020202020204" pitchFamily="34" charset="0"/>
+              </a:rPr>
+              <a:t>2</a:t>
+            </a:r>
+            <a:endParaRPr lang="it-IT" sz="2000" b="0" cap="none" spc="0" dirty="0">
+              <a:ln w="0"/>
+              <a:solidFill>
+                <a:schemeClr val="tx1"/>
+              </a:solidFill>
+              <a:effectLst>
+                <a:outerShdw blurRad="38100" dist="19050" dir="2700000" algn="tl" rotWithShape="0">
+                  <a:schemeClr val="dk1">
+                    <a:alpha val="40000"/>
+                  </a:schemeClr>
+                </a:outerShdw>
+              </a:effectLst>
+            </a:endParaRPr>
+          </a:p>
+        </p:txBody>
+      </p:sp>
+      <p:sp>
+        <p:nvSpPr>
+          <p:cNvPr id="250" name="Rettangolo 249">
+            <a:extLst>
+              <a:ext uri="{FF2B5EF4-FFF2-40B4-BE49-F238E27FC236}">
+                <a16:creationId xmlns:a16="http://schemas.microsoft.com/office/drawing/2014/main" id="{10EAF8FE-07A6-47C0-A6A4-848F01FCE72F}"/>
+              </a:ext>
+            </a:extLst>
+          </p:cNvPr>
+          <p:cNvSpPr/>
+          <p:nvPr/>
+        </p:nvSpPr>
+        <p:spPr>
+          <a:xfrm>
+            <a:off x="10992743" y="2956019"/>
+            <a:ext cx="1090790" cy="400110"/>
+          </a:xfrm>
+          <a:prstGeom prst="rect">
+            <a:avLst/>
+          </a:prstGeom>
+          <a:noFill/>
+        </p:spPr>
+        <p:txBody>
+          <a:bodyPr wrap="square" lIns="91440" tIns="45720" rIns="91440" bIns="45720">
+            <a:spAutoFit/>
+          </a:bodyPr>
+          <a:lstStyle/>
+          <a:p>
+            <a:pPr algn="ctr"/>
+            <a:r>
+              <a:rPr lang="it-IT" sz="2000" b="0" cap="none" spc="0" dirty="0">
+                <a:ln w="0"/>
+                <a:solidFill>
+                  <a:schemeClr val="tx1"/>
+                </a:solidFill>
+                <a:effectLst>
+                  <a:outerShdw blurRad="38100" dist="19050" dir="2700000" algn="tl" rotWithShape="0">
+                    <a:schemeClr val="dk1">
+                      <a:alpha val="40000"/>
+                    </a:schemeClr>
+                  </a:outerShdw>
+                </a:effectLst>
+              </a:rPr>
+              <a:t>0/</a:t>
+            </a:r>
+            <a:r>
+              <a:rPr lang="it-IT" sz="2000" dirty="0">
+                <a:ln w="0"/>
+                <a:effectLst>
+                  <a:outerShdw blurRad="38100" dist="19050" dir="2700000" algn="tl" rotWithShape="0">
+                    <a:schemeClr val="dk1">
+                      <a:alpha val="40000"/>
+                    </a:schemeClr>
+                  </a:outerShdw>
+                </a:effectLst>
+                <a:latin typeface="Arial" panose="020B0604020202020204" pitchFamily="34" charset="0"/>
+                <a:cs typeface="Arial" panose="020B0604020202020204" pitchFamily="34" charset="0"/>
+              </a:rPr>
+              <a:t>S</a:t>
+            </a:r>
+            <a:r>
+              <a:rPr lang="it-IT" sz="2000" baseline="-25000" dirty="0">
+                <a:latin typeface="Arial" panose="020B0604020202020204" pitchFamily="34" charset="0"/>
+                <a:cs typeface="Arial" panose="020B0604020202020204" pitchFamily="34" charset="0"/>
+              </a:rPr>
+              <a:t>f</a:t>
+            </a:r>
+            <a:r>
+              <a:rPr lang="it-IT" sz="1100" baseline="-60000" dirty="0">
+                <a:latin typeface="Arial" panose="020B0604020202020204" pitchFamily="34" charset="0"/>
+                <a:cs typeface="Arial" panose="020B0604020202020204" pitchFamily="34" charset="0"/>
+              </a:rPr>
+              <a:t>4</a:t>
+            </a:r>
+            <a:endParaRPr lang="it-IT" sz="2000" b="0" cap="none" spc="0" dirty="0">
+              <a:ln w="0"/>
+              <a:solidFill>
+                <a:schemeClr val="tx1"/>
+              </a:solidFill>
+              <a:effectLst>
+                <a:outerShdw blurRad="38100" dist="19050" dir="2700000" algn="tl" rotWithShape="0">
+                  <a:schemeClr val="dk1">
+                    <a:alpha val="40000"/>
+                  </a:schemeClr>
+                </a:outerShdw>
+              </a:effectLst>
+            </a:endParaRPr>
+          </a:p>
+        </p:txBody>
+      </p:sp>
+      <p:sp>
+        <p:nvSpPr>
+          <p:cNvPr id="251" name="Rettangolo 250">
+            <a:extLst>
+              <a:ext uri="{FF2B5EF4-FFF2-40B4-BE49-F238E27FC236}">
+                <a16:creationId xmlns:a16="http://schemas.microsoft.com/office/drawing/2014/main" id="{CA5B068D-C552-49EF-A9BF-0082FFDA0E5A}"/>
+              </a:ext>
+            </a:extLst>
+          </p:cNvPr>
+          <p:cNvSpPr/>
+          <p:nvPr/>
+        </p:nvSpPr>
+        <p:spPr>
+          <a:xfrm>
+            <a:off x="1700616" y="2306646"/>
+            <a:ext cx="1349907" cy="400110"/>
+          </a:xfrm>
+          <a:prstGeom prst="rect">
+            <a:avLst/>
+          </a:prstGeom>
+          <a:noFill/>
+        </p:spPr>
+        <p:txBody>
+          <a:bodyPr wrap="square" lIns="91440" tIns="45720" rIns="91440" bIns="45720">
+            <a:spAutoFit/>
+          </a:bodyPr>
+          <a:lstStyle/>
+          <a:p>
+            <a:pPr algn="ctr"/>
+            <a:r>
+              <a:rPr lang="it-IT" sz="2000" b="0" cap="none" spc="0" dirty="0">
+                <a:ln w="0"/>
+                <a:solidFill>
+                  <a:schemeClr val="tx1"/>
+                </a:solidFill>
+                <a:effectLst>
+                  <a:outerShdw blurRad="38100" dist="19050" dir="2700000" algn="tl" rotWithShape="0">
+                    <a:schemeClr val="dk1">
+                      <a:alpha val="40000"/>
+                    </a:schemeClr>
+                  </a:outerShdw>
+                </a:effectLst>
+              </a:rPr>
+              <a:t>0/</a:t>
+            </a:r>
+            <a:r>
+              <a:rPr lang="it-IT" sz="2000" dirty="0">
+                <a:ln w="0"/>
+                <a:effectLst>
+                  <a:outerShdw blurRad="38100" dist="19050" dir="2700000" algn="tl" rotWithShape="0">
+                    <a:schemeClr val="dk1">
+                      <a:alpha val="40000"/>
+                    </a:schemeClr>
+                  </a:outerShdw>
+                </a:effectLst>
+                <a:latin typeface="Arial" panose="020B0604020202020204" pitchFamily="34" charset="0"/>
+                <a:cs typeface="Arial" panose="020B0604020202020204" pitchFamily="34" charset="0"/>
+              </a:rPr>
+              <a:t>N</a:t>
+            </a:r>
+            <a:r>
+              <a:rPr lang="it-IT" sz="2000" baseline="-25000" dirty="0">
+                <a:latin typeface="Arial" panose="020B0604020202020204" pitchFamily="34" charset="0"/>
+                <a:cs typeface="Arial" panose="020B0604020202020204" pitchFamily="34" charset="0"/>
+              </a:rPr>
+              <a:t>f</a:t>
+            </a:r>
+            <a:r>
+              <a:rPr lang="it-IT" sz="1100" baseline="-60000" dirty="0">
+                <a:latin typeface="Arial" panose="020B0604020202020204" pitchFamily="34" charset="0"/>
+                <a:cs typeface="Arial" panose="020B0604020202020204" pitchFamily="34" charset="0"/>
+              </a:rPr>
+              <a:t>3</a:t>
+            </a:r>
+            <a:r>
+              <a:rPr lang="it-IT" sz="2000" dirty="0">
+                <a:ln w="0"/>
+                <a:effectLst>
+                  <a:outerShdw blurRad="38100" dist="19050" dir="2700000" algn="tl" rotWithShape="0">
+                    <a:schemeClr val="dk1">
+                      <a:alpha val="40000"/>
+                    </a:schemeClr>
+                  </a:outerShdw>
+                </a:effectLst>
+                <a:latin typeface="Arial" panose="020B0604020202020204" pitchFamily="34" charset="0"/>
+                <a:cs typeface="Arial" panose="020B0604020202020204" pitchFamily="34" charset="0"/>
+              </a:rPr>
+              <a:t>-S</a:t>
+            </a:r>
+            <a:r>
+              <a:rPr lang="it-IT" sz="2000" baseline="-25000" dirty="0">
+                <a:latin typeface="Arial" panose="020B0604020202020204" pitchFamily="34" charset="0"/>
+                <a:cs typeface="Arial" panose="020B0604020202020204" pitchFamily="34" charset="0"/>
+              </a:rPr>
+              <a:t>f</a:t>
+            </a:r>
+            <a:r>
+              <a:rPr lang="it-IT" sz="1100" baseline="-60000" dirty="0">
+                <a:latin typeface="Arial" panose="020B0604020202020204" pitchFamily="34" charset="0"/>
+                <a:cs typeface="Arial" panose="020B0604020202020204" pitchFamily="34" charset="0"/>
+              </a:rPr>
+              <a:t>3</a:t>
+            </a:r>
+            <a:endParaRPr lang="it-IT" sz="2000" b="0" cap="none" spc="0" dirty="0">
+              <a:ln w="0"/>
+              <a:solidFill>
+                <a:schemeClr val="tx1"/>
+              </a:solidFill>
+              <a:effectLst>
+                <a:outerShdw blurRad="38100" dist="19050" dir="2700000" algn="tl" rotWithShape="0">
+                  <a:schemeClr val="dk1">
+                    <a:alpha val="40000"/>
+                  </a:schemeClr>
+                </a:outerShdw>
+              </a:effectLst>
+            </a:endParaRPr>
+          </a:p>
+        </p:txBody>
+      </p:sp>
+      <p:sp>
+        <p:nvSpPr>
+          <p:cNvPr id="252" name="Rettangolo 251">
+            <a:extLst>
+              <a:ext uri="{FF2B5EF4-FFF2-40B4-BE49-F238E27FC236}">
+                <a16:creationId xmlns:a16="http://schemas.microsoft.com/office/drawing/2014/main" id="{8BB90D1F-955B-4DB6-B706-B64639BBDD13}"/>
+              </a:ext>
+            </a:extLst>
+          </p:cNvPr>
+          <p:cNvSpPr/>
+          <p:nvPr/>
+        </p:nvSpPr>
+        <p:spPr>
+          <a:xfrm>
+            <a:off x="5510357" y="1222504"/>
+            <a:ext cx="1349907" cy="400110"/>
+          </a:xfrm>
+          <a:prstGeom prst="rect">
+            <a:avLst/>
+          </a:prstGeom>
+          <a:noFill/>
+        </p:spPr>
+        <p:txBody>
+          <a:bodyPr wrap="square" lIns="91440" tIns="45720" rIns="91440" bIns="45720">
+            <a:spAutoFit/>
+          </a:bodyPr>
+          <a:lstStyle/>
+          <a:p>
+            <a:pPr algn="ctr"/>
+            <a:r>
+              <a:rPr lang="it-IT" sz="2000" b="0" cap="none" spc="0" dirty="0">
+                <a:ln w="0"/>
+                <a:solidFill>
+                  <a:schemeClr val="tx1"/>
+                </a:solidFill>
+                <a:effectLst>
+                  <a:outerShdw blurRad="38100" dist="19050" dir="2700000" algn="tl" rotWithShape="0">
+                    <a:schemeClr val="dk1">
+                      <a:alpha val="40000"/>
+                    </a:schemeClr>
+                  </a:outerShdw>
+                </a:effectLst>
+              </a:rPr>
+              <a:t>0/</a:t>
+            </a:r>
+            <a:r>
+              <a:rPr lang="it-IT" sz="2000" dirty="0">
+                <a:ln w="0"/>
+                <a:effectLst>
+                  <a:outerShdw blurRad="38100" dist="19050" dir="2700000" algn="tl" rotWithShape="0">
+                    <a:schemeClr val="dk1">
+                      <a:alpha val="40000"/>
+                    </a:schemeClr>
+                  </a:outerShdw>
+                </a:effectLst>
+                <a:latin typeface="Arial" panose="020B0604020202020204" pitchFamily="34" charset="0"/>
+                <a:cs typeface="Arial" panose="020B0604020202020204" pitchFamily="34" charset="0"/>
+              </a:rPr>
+              <a:t>N</a:t>
+            </a:r>
+            <a:r>
+              <a:rPr lang="it-IT" sz="2000" baseline="-25000" dirty="0">
+                <a:latin typeface="Arial" panose="020B0604020202020204" pitchFamily="34" charset="0"/>
+                <a:cs typeface="Arial" panose="020B0604020202020204" pitchFamily="34" charset="0"/>
+              </a:rPr>
+              <a:t>f</a:t>
+            </a:r>
+            <a:r>
+              <a:rPr lang="it-IT" sz="1100" baseline="-60000" dirty="0">
+                <a:latin typeface="Arial" panose="020B0604020202020204" pitchFamily="34" charset="0"/>
+                <a:cs typeface="Arial" panose="020B0604020202020204" pitchFamily="34" charset="0"/>
+              </a:rPr>
+              <a:t>2</a:t>
+            </a:r>
+            <a:r>
+              <a:rPr lang="it-IT" sz="2000" dirty="0">
+                <a:ln w="0"/>
+                <a:effectLst>
+                  <a:outerShdw blurRad="38100" dist="19050" dir="2700000" algn="tl" rotWithShape="0">
+                    <a:schemeClr val="dk1">
+                      <a:alpha val="40000"/>
+                    </a:schemeClr>
+                  </a:outerShdw>
+                </a:effectLst>
+                <a:latin typeface="Arial" panose="020B0604020202020204" pitchFamily="34" charset="0"/>
+                <a:cs typeface="Arial" panose="020B0604020202020204" pitchFamily="34" charset="0"/>
+              </a:rPr>
+              <a:t>-S</a:t>
+            </a:r>
+            <a:r>
+              <a:rPr lang="it-IT" sz="2000" baseline="-25000" dirty="0">
+                <a:latin typeface="Arial" panose="020B0604020202020204" pitchFamily="34" charset="0"/>
+                <a:cs typeface="Arial" panose="020B0604020202020204" pitchFamily="34" charset="0"/>
+              </a:rPr>
+              <a:t>f</a:t>
+            </a:r>
+            <a:r>
+              <a:rPr lang="it-IT" sz="1100" baseline="-60000" dirty="0">
+                <a:latin typeface="Arial" panose="020B0604020202020204" pitchFamily="34" charset="0"/>
+                <a:cs typeface="Arial" panose="020B0604020202020204" pitchFamily="34" charset="0"/>
+              </a:rPr>
+              <a:t>2</a:t>
+            </a:r>
+            <a:endParaRPr lang="it-IT" sz="2000" b="0" cap="none" spc="0" dirty="0">
+              <a:ln w="0"/>
+              <a:solidFill>
+                <a:schemeClr val="tx1"/>
+              </a:solidFill>
+              <a:effectLst>
+                <a:outerShdw blurRad="38100" dist="19050" dir="2700000" algn="tl" rotWithShape="0">
+                  <a:schemeClr val="dk1">
+                    <a:alpha val="40000"/>
+                  </a:schemeClr>
+                </a:outerShdw>
+              </a:effectLst>
+            </a:endParaRPr>
+          </a:p>
+        </p:txBody>
+      </p:sp>
+      <p:sp>
+        <p:nvSpPr>
+          <p:cNvPr id="253" name="Rettangolo 252">
+            <a:extLst>
+              <a:ext uri="{FF2B5EF4-FFF2-40B4-BE49-F238E27FC236}">
+                <a16:creationId xmlns:a16="http://schemas.microsoft.com/office/drawing/2014/main" id="{023ED21E-89D5-4233-A3A1-0827B8C45C0A}"/>
+              </a:ext>
+            </a:extLst>
+          </p:cNvPr>
+          <p:cNvSpPr/>
+          <p:nvPr/>
+        </p:nvSpPr>
+        <p:spPr>
+          <a:xfrm>
+            <a:off x="6615447" y="4740028"/>
+            <a:ext cx="1349907" cy="400110"/>
+          </a:xfrm>
+          <a:prstGeom prst="rect">
+            <a:avLst/>
+          </a:prstGeom>
+          <a:noFill/>
+        </p:spPr>
+        <p:txBody>
+          <a:bodyPr wrap="square" lIns="91440" tIns="45720" rIns="91440" bIns="45720">
+            <a:spAutoFit/>
+          </a:bodyPr>
+          <a:lstStyle/>
+          <a:p>
+            <a:pPr algn="ctr"/>
+            <a:r>
+              <a:rPr lang="it-IT" sz="2000" b="0" cap="none" spc="0" dirty="0">
+                <a:ln w="0"/>
+                <a:solidFill>
+                  <a:schemeClr val="tx1"/>
+                </a:solidFill>
+                <a:effectLst>
+                  <a:outerShdw blurRad="38100" dist="19050" dir="2700000" algn="tl" rotWithShape="0">
+                    <a:schemeClr val="dk1">
+                      <a:alpha val="40000"/>
+                    </a:schemeClr>
+                  </a:outerShdw>
+                </a:effectLst>
+              </a:rPr>
+              <a:t>0/</a:t>
+            </a:r>
+            <a:r>
+              <a:rPr lang="it-IT" sz="2000" dirty="0">
+                <a:ln w="0"/>
+                <a:effectLst>
+                  <a:outerShdw blurRad="38100" dist="19050" dir="2700000" algn="tl" rotWithShape="0">
+                    <a:schemeClr val="dk1">
+                      <a:alpha val="40000"/>
+                    </a:schemeClr>
+                  </a:outerShdw>
+                </a:effectLst>
+                <a:latin typeface="Arial" panose="020B0604020202020204" pitchFamily="34" charset="0"/>
+                <a:cs typeface="Arial" panose="020B0604020202020204" pitchFamily="34" charset="0"/>
+              </a:rPr>
+              <a:t>N</a:t>
+            </a:r>
+            <a:r>
+              <a:rPr lang="it-IT" sz="2000" baseline="-25000" dirty="0">
+                <a:latin typeface="Arial" panose="020B0604020202020204" pitchFamily="34" charset="0"/>
+                <a:cs typeface="Arial" panose="020B0604020202020204" pitchFamily="34" charset="0"/>
+              </a:rPr>
+              <a:t>f</a:t>
+            </a:r>
+            <a:r>
+              <a:rPr lang="it-IT" sz="1100" baseline="-60000" dirty="0">
+                <a:latin typeface="Arial" panose="020B0604020202020204" pitchFamily="34" charset="0"/>
+                <a:cs typeface="Arial" panose="020B0604020202020204" pitchFamily="34" charset="0"/>
+              </a:rPr>
+              <a:t>1</a:t>
+            </a:r>
+            <a:r>
+              <a:rPr lang="it-IT" sz="2000" dirty="0">
+                <a:ln w="0"/>
+                <a:effectLst>
+                  <a:outerShdw blurRad="38100" dist="19050" dir="2700000" algn="tl" rotWithShape="0">
+                    <a:schemeClr val="dk1">
+                      <a:alpha val="40000"/>
+                    </a:schemeClr>
+                  </a:outerShdw>
+                </a:effectLst>
+                <a:latin typeface="Arial" panose="020B0604020202020204" pitchFamily="34" charset="0"/>
+                <a:cs typeface="Arial" panose="020B0604020202020204" pitchFamily="34" charset="0"/>
+              </a:rPr>
+              <a:t>-S</a:t>
+            </a:r>
+            <a:r>
+              <a:rPr lang="it-IT" sz="2000" baseline="-25000" dirty="0">
+                <a:latin typeface="Arial" panose="020B0604020202020204" pitchFamily="34" charset="0"/>
+                <a:cs typeface="Arial" panose="020B0604020202020204" pitchFamily="34" charset="0"/>
+              </a:rPr>
+              <a:t>f</a:t>
+            </a:r>
+            <a:r>
+              <a:rPr lang="it-IT" sz="1100" baseline="-60000" dirty="0">
+                <a:latin typeface="Arial" panose="020B0604020202020204" pitchFamily="34" charset="0"/>
+                <a:cs typeface="Arial" panose="020B0604020202020204" pitchFamily="34" charset="0"/>
+              </a:rPr>
+              <a:t>1</a:t>
+            </a:r>
+            <a:endParaRPr lang="it-IT" sz="2000" b="0" cap="none" spc="0" dirty="0">
+              <a:ln w="0"/>
+              <a:solidFill>
+                <a:schemeClr val="tx1"/>
+              </a:solidFill>
+              <a:effectLst>
+                <a:outerShdw blurRad="38100" dist="19050" dir="2700000" algn="tl" rotWithShape="0">
+                  <a:schemeClr val="dk1">
+                    <a:alpha val="40000"/>
+                  </a:schemeClr>
+                </a:outerShdw>
+              </a:effectLst>
+            </a:endParaRPr>
+          </a:p>
+        </p:txBody>
+      </p:sp>
+      <p:sp>
+        <p:nvSpPr>
+          <p:cNvPr id="254" name="Rettangolo 253">
+            <a:extLst>
+              <a:ext uri="{FF2B5EF4-FFF2-40B4-BE49-F238E27FC236}">
+                <a16:creationId xmlns:a16="http://schemas.microsoft.com/office/drawing/2014/main" id="{AAAE269E-023A-4A65-B04E-29D9165542BF}"/>
+              </a:ext>
+            </a:extLst>
+          </p:cNvPr>
+          <p:cNvSpPr/>
+          <p:nvPr/>
+        </p:nvSpPr>
+        <p:spPr>
+          <a:xfrm>
+            <a:off x="8906807" y="1188020"/>
+            <a:ext cx="1349907" cy="400110"/>
+          </a:xfrm>
+          <a:prstGeom prst="rect">
+            <a:avLst/>
+          </a:prstGeom>
+          <a:noFill/>
+        </p:spPr>
+        <p:txBody>
+          <a:bodyPr wrap="square" lIns="91440" tIns="45720" rIns="91440" bIns="45720">
+            <a:spAutoFit/>
+          </a:bodyPr>
+          <a:lstStyle/>
+          <a:p>
+            <a:pPr algn="ctr"/>
+            <a:r>
+              <a:rPr lang="it-IT" sz="2000" b="0" cap="none" spc="0" dirty="0">
+                <a:ln w="0"/>
+                <a:solidFill>
+                  <a:schemeClr val="tx1"/>
+                </a:solidFill>
+                <a:effectLst>
+                  <a:outerShdw blurRad="38100" dist="19050" dir="2700000" algn="tl" rotWithShape="0">
+                    <a:schemeClr val="dk1">
+                      <a:alpha val="40000"/>
+                    </a:schemeClr>
+                  </a:outerShdw>
+                </a:effectLst>
+              </a:rPr>
+              <a:t>0/</a:t>
+            </a:r>
+            <a:r>
+              <a:rPr lang="it-IT" sz="2000" dirty="0">
+                <a:ln w="0"/>
+                <a:effectLst>
+                  <a:outerShdw blurRad="38100" dist="19050" dir="2700000" algn="tl" rotWithShape="0">
+                    <a:schemeClr val="dk1">
+                      <a:alpha val="40000"/>
+                    </a:schemeClr>
+                  </a:outerShdw>
+                </a:effectLst>
+                <a:latin typeface="Arial" panose="020B0604020202020204" pitchFamily="34" charset="0"/>
+                <a:cs typeface="Arial" panose="020B0604020202020204" pitchFamily="34" charset="0"/>
+              </a:rPr>
+              <a:t>N</a:t>
+            </a:r>
+            <a:r>
+              <a:rPr lang="it-IT" sz="2000" baseline="-25000" dirty="0">
+                <a:latin typeface="Arial" panose="020B0604020202020204" pitchFamily="34" charset="0"/>
+                <a:cs typeface="Arial" panose="020B0604020202020204" pitchFamily="34" charset="0"/>
+              </a:rPr>
+              <a:t>f</a:t>
+            </a:r>
+            <a:r>
+              <a:rPr lang="it-IT" sz="1100" baseline="-60000" dirty="0">
+                <a:latin typeface="Arial" panose="020B0604020202020204" pitchFamily="34" charset="0"/>
+                <a:cs typeface="Arial" panose="020B0604020202020204" pitchFamily="34" charset="0"/>
+              </a:rPr>
+              <a:t>4</a:t>
+            </a:r>
+            <a:r>
+              <a:rPr lang="it-IT" sz="2000" dirty="0">
+                <a:ln w="0"/>
+                <a:effectLst>
+                  <a:outerShdw blurRad="38100" dist="19050" dir="2700000" algn="tl" rotWithShape="0">
+                    <a:schemeClr val="dk1">
+                      <a:alpha val="40000"/>
+                    </a:schemeClr>
+                  </a:outerShdw>
+                </a:effectLst>
+                <a:latin typeface="Arial" panose="020B0604020202020204" pitchFamily="34" charset="0"/>
+                <a:cs typeface="Arial" panose="020B0604020202020204" pitchFamily="34" charset="0"/>
+              </a:rPr>
+              <a:t>-S</a:t>
+            </a:r>
+            <a:r>
+              <a:rPr lang="it-IT" sz="2000" baseline="-25000" dirty="0">
+                <a:latin typeface="Arial" panose="020B0604020202020204" pitchFamily="34" charset="0"/>
+                <a:cs typeface="Arial" panose="020B0604020202020204" pitchFamily="34" charset="0"/>
+              </a:rPr>
+              <a:t>f</a:t>
+            </a:r>
+            <a:r>
+              <a:rPr lang="it-IT" sz="1100" baseline="-60000" dirty="0">
+                <a:latin typeface="Arial" panose="020B0604020202020204" pitchFamily="34" charset="0"/>
+                <a:cs typeface="Arial" panose="020B0604020202020204" pitchFamily="34" charset="0"/>
+              </a:rPr>
+              <a:t>4</a:t>
+            </a:r>
+            <a:endParaRPr lang="it-IT" sz="2000" b="0" cap="none" spc="0" dirty="0">
+              <a:ln w="0"/>
+              <a:solidFill>
+                <a:schemeClr val="tx1"/>
+              </a:solidFill>
+              <a:effectLst>
+                <a:outerShdw blurRad="38100" dist="19050" dir="2700000" algn="tl" rotWithShape="0">
+                  <a:schemeClr val="dk1">
+                    <a:alpha val="40000"/>
+                  </a:schemeClr>
+                </a:outerShdw>
+              </a:effectLst>
+            </a:endParaRPr>
+          </a:p>
+        </p:txBody>
+      </p:sp>
+      <p:sp>
+        <p:nvSpPr>
+          <p:cNvPr id="255" name="CasellaDiTesto 254">
+            <a:extLst>
+              <a:ext uri="{FF2B5EF4-FFF2-40B4-BE49-F238E27FC236}">
+                <a16:creationId xmlns:a16="http://schemas.microsoft.com/office/drawing/2014/main" id="{1162ED86-597D-45AE-A2E5-EB4EE2790803}"/>
+              </a:ext>
+            </a:extLst>
+          </p:cNvPr>
+          <p:cNvSpPr txBox="1"/>
+          <p:nvPr/>
+        </p:nvSpPr>
+        <p:spPr>
+          <a:xfrm>
+            <a:off x="1271739" y="1644928"/>
+            <a:ext cx="534121" cy="584775"/>
+          </a:xfrm>
+          <a:prstGeom prst="rect">
+            <a:avLst/>
+          </a:prstGeom>
+          <a:noFill/>
+        </p:spPr>
+        <p:txBody>
+          <a:bodyPr wrap="none" rtlCol="0">
+            <a:spAutoFit/>
+          </a:bodyPr>
+          <a:lstStyle/>
+          <a:p>
+            <a:r>
+              <a:rPr lang="it-IT" sz="3200" dirty="0"/>
+              <a:t>∞</a:t>
+            </a:r>
+          </a:p>
+        </p:txBody>
+      </p:sp>
+      <p:sp>
+        <p:nvSpPr>
+          <p:cNvPr id="256" name="CasellaDiTesto 255">
+            <a:extLst>
+              <a:ext uri="{FF2B5EF4-FFF2-40B4-BE49-F238E27FC236}">
+                <a16:creationId xmlns:a16="http://schemas.microsoft.com/office/drawing/2014/main" id="{F1F47487-6D4E-45C4-9B29-F37B074F837D}"/>
+              </a:ext>
+            </a:extLst>
+          </p:cNvPr>
+          <p:cNvSpPr txBox="1"/>
+          <p:nvPr/>
+        </p:nvSpPr>
+        <p:spPr>
+          <a:xfrm>
+            <a:off x="1700616" y="5048736"/>
+            <a:ext cx="534121" cy="584775"/>
+          </a:xfrm>
+          <a:prstGeom prst="rect">
+            <a:avLst/>
+          </a:prstGeom>
+          <a:noFill/>
+        </p:spPr>
+        <p:txBody>
+          <a:bodyPr wrap="none" rtlCol="0">
+            <a:spAutoFit/>
+          </a:bodyPr>
+          <a:lstStyle/>
+          <a:p>
+            <a:r>
+              <a:rPr lang="it-IT" sz="3200" dirty="0"/>
+              <a:t>∞</a:t>
+            </a:r>
+          </a:p>
+        </p:txBody>
+      </p:sp>
+      <p:sp>
+        <p:nvSpPr>
+          <p:cNvPr id="257" name="CasellaDiTesto 256">
+            <a:extLst>
+              <a:ext uri="{FF2B5EF4-FFF2-40B4-BE49-F238E27FC236}">
+                <a16:creationId xmlns:a16="http://schemas.microsoft.com/office/drawing/2014/main" id="{AE27CDA1-D62B-41B2-9833-C789F03B78C9}"/>
+              </a:ext>
+            </a:extLst>
+          </p:cNvPr>
+          <p:cNvSpPr txBox="1"/>
+          <p:nvPr/>
+        </p:nvSpPr>
+        <p:spPr>
+          <a:xfrm>
+            <a:off x="6655040" y="2457170"/>
+            <a:ext cx="534121" cy="584775"/>
+          </a:xfrm>
+          <a:prstGeom prst="rect">
+            <a:avLst/>
+          </a:prstGeom>
+          <a:noFill/>
+        </p:spPr>
+        <p:txBody>
+          <a:bodyPr wrap="none" rtlCol="0">
+            <a:spAutoFit/>
+          </a:bodyPr>
+          <a:lstStyle/>
+          <a:p>
+            <a:r>
+              <a:rPr lang="it-IT" sz="3200" dirty="0"/>
+              <a:t>∞</a:t>
+            </a:r>
+          </a:p>
+        </p:txBody>
+      </p:sp>
+      <p:sp>
+        <p:nvSpPr>
+          <p:cNvPr id="258" name="CasellaDiTesto 257">
+            <a:extLst>
+              <a:ext uri="{FF2B5EF4-FFF2-40B4-BE49-F238E27FC236}">
+                <a16:creationId xmlns:a16="http://schemas.microsoft.com/office/drawing/2014/main" id="{74FF19F8-A361-4648-9A05-799404725420}"/>
+              </a:ext>
+            </a:extLst>
+          </p:cNvPr>
+          <p:cNvSpPr txBox="1"/>
+          <p:nvPr/>
+        </p:nvSpPr>
+        <p:spPr>
+          <a:xfrm>
+            <a:off x="5330528" y="3230858"/>
+            <a:ext cx="534121" cy="584775"/>
+          </a:xfrm>
+          <a:prstGeom prst="rect">
+            <a:avLst/>
+          </a:prstGeom>
+          <a:noFill/>
+        </p:spPr>
+        <p:txBody>
+          <a:bodyPr wrap="none" rtlCol="0">
+            <a:spAutoFit/>
+          </a:bodyPr>
+          <a:lstStyle/>
+          <a:p>
+            <a:r>
+              <a:rPr lang="it-IT" sz="3200" dirty="0"/>
+              <a:t>∞</a:t>
+            </a:r>
+          </a:p>
+        </p:txBody>
+      </p:sp>
+      <p:sp>
+        <p:nvSpPr>
+          <p:cNvPr id="259" name="CasellaDiTesto 258">
+            <a:extLst>
+              <a:ext uri="{FF2B5EF4-FFF2-40B4-BE49-F238E27FC236}">
+                <a16:creationId xmlns:a16="http://schemas.microsoft.com/office/drawing/2014/main" id="{79CC61A6-6BDC-4088-A8F0-AF882023B450}"/>
+              </a:ext>
+            </a:extLst>
+          </p:cNvPr>
+          <p:cNvSpPr txBox="1"/>
+          <p:nvPr/>
+        </p:nvSpPr>
+        <p:spPr>
+          <a:xfrm>
+            <a:off x="8588798" y="1870219"/>
+            <a:ext cx="534121" cy="584775"/>
+          </a:xfrm>
+          <a:prstGeom prst="rect">
+            <a:avLst/>
+          </a:prstGeom>
+          <a:noFill/>
+        </p:spPr>
+        <p:txBody>
+          <a:bodyPr wrap="none" rtlCol="0">
+            <a:spAutoFit/>
+          </a:bodyPr>
+          <a:lstStyle/>
+          <a:p>
+            <a:r>
+              <a:rPr lang="it-IT" sz="3200" dirty="0"/>
+              <a:t>∞</a:t>
+            </a:r>
+          </a:p>
+        </p:txBody>
+      </p:sp>
+      <p:sp>
+        <p:nvSpPr>
+          <p:cNvPr id="260" name="CasellaDiTesto 259">
+            <a:extLst>
+              <a:ext uri="{FF2B5EF4-FFF2-40B4-BE49-F238E27FC236}">
+                <a16:creationId xmlns:a16="http://schemas.microsoft.com/office/drawing/2014/main" id="{53D7D547-F8BC-4C8C-9313-2FE1B97EBEC2}"/>
+              </a:ext>
+            </a:extLst>
+          </p:cNvPr>
+          <p:cNvSpPr txBox="1"/>
+          <p:nvPr/>
+        </p:nvSpPr>
+        <p:spPr>
+          <a:xfrm>
+            <a:off x="4572189" y="1922692"/>
+            <a:ext cx="534121" cy="584775"/>
+          </a:xfrm>
+          <a:prstGeom prst="rect">
+            <a:avLst/>
+          </a:prstGeom>
+          <a:noFill/>
+        </p:spPr>
+        <p:txBody>
+          <a:bodyPr wrap="none" rtlCol="0">
+            <a:spAutoFit/>
+          </a:bodyPr>
+          <a:lstStyle/>
+          <a:p>
+            <a:r>
+              <a:rPr lang="it-IT" sz="3200" dirty="0"/>
+              <a:t>∞</a:t>
+            </a:r>
+          </a:p>
+        </p:txBody>
+      </p:sp>
+      <p:sp>
+        <p:nvSpPr>
+          <p:cNvPr id="261" name="CasellaDiTesto 260">
+            <a:extLst>
+              <a:ext uri="{FF2B5EF4-FFF2-40B4-BE49-F238E27FC236}">
+                <a16:creationId xmlns:a16="http://schemas.microsoft.com/office/drawing/2014/main" id="{113181E5-9AB7-40DA-9A21-534B2E19ECEF}"/>
+              </a:ext>
+            </a:extLst>
+          </p:cNvPr>
+          <p:cNvSpPr txBox="1"/>
+          <p:nvPr/>
+        </p:nvSpPr>
+        <p:spPr>
+          <a:xfrm>
+            <a:off x="3476042" y="4272406"/>
+            <a:ext cx="534121" cy="584775"/>
+          </a:xfrm>
+          <a:prstGeom prst="rect">
+            <a:avLst/>
+          </a:prstGeom>
+          <a:noFill/>
+        </p:spPr>
+        <p:txBody>
+          <a:bodyPr wrap="none" rtlCol="0">
+            <a:spAutoFit/>
+          </a:bodyPr>
+          <a:lstStyle/>
+          <a:p>
+            <a:r>
+              <a:rPr lang="it-IT" sz="3200" dirty="0"/>
+              <a:t>∞</a:t>
+            </a:r>
+          </a:p>
+        </p:txBody>
+      </p:sp>
+      <p:sp>
+        <p:nvSpPr>
+          <p:cNvPr id="262" name="CasellaDiTesto 261">
+            <a:extLst>
+              <a:ext uri="{FF2B5EF4-FFF2-40B4-BE49-F238E27FC236}">
+                <a16:creationId xmlns:a16="http://schemas.microsoft.com/office/drawing/2014/main" id="{1E9864A6-1455-48D9-BC72-7DA165417819}"/>
+              </a:ext>
+            </a:extLst>
+          </p:cNvPr>
+          <p:cNvSpPr txBox="1"/>
+          <p:nvPr/>
+        </p:nvSpPr>
+        <p:spPr>
+          <a:xfrm>
+            <a:off x="3089293" y="1181948"/>
+            <a:ext cx="534121" cy="584775"/>
+          </a:xfrm>
+          <a:prstGeom prst="rect">
+            <a:avLst/>
+          </a:prstGeom>
+          <a:noFill/>
+        </p:spPr>
+        <p:txBody>
+          <a:bodyPr wrap="none" rtlCol="0">
+            <a:spAutoFit/>
+          </a:bodyPr>
+          <a:lstStyle/>
+          <a:p>
+            <a:r>
+              <a:rPr lang="it-IT" sz="3200" dirty="0"/>
+              <a:t>∞</a:t>
+            </a:r>
+          </a:p>
+        </p:txBody>
+      </p:sp>
+    </p:spTree>
+    <p:extLst>
+      <p:ext uri="{BB962C8B-B14F-4D97-AF65-F5344CB8AC3E}">
+        <p14:creationId xmlns:p14="http://schemas.microsoft.com/office/powerpoint/2010/main" val="972316452"/>
       </p:ext>
     </p:extLst>
   </p:cSld>

</xml_diff>